<commit_message>
fix code after intensive refactor https://github.com/ajz34/rstsr/commit/9c29b40f8dea5ee687c3a849d9ee5436a5b776cd
</commit_message>
<xml_diff>
--- a/src/assets/rstsr-basic-structure.pptx
+++ b/src/assets/rstsr-basic-structure.pptx
@@ -113,12 +113,12 @@
   <p:extLst>
     <p:ext uri="{EFAFB233-063F-42B5-8137-9DF3F51BA10A}">
       <p15:sldGuideLst xmlns:p15="http://schemas.microsoft.com/office/powerpoint/2012/main">
-        <p15:guide id="1" orient="horz" pos="2160" userDrawn="1">
+        <p15:guide id="1" orient="horz" pos="2163" userDrawn="1">
           <p15:clr>
             <a:srgbClr val="A4A3A4"/>
           </p15:clr>
         </p15:guide>
-        <p15:guide id="2" pos="3840" userDrawn="1">
+        <p15:guide id="2" pos="3833" userDrawn="1">
           <p15:clr>
             <a:srgbClr val="A4A3A4"/>
           </p15:clr>
@@ -3560,8 +3560,8 @@
         </p:nvSpPr>
         <p:spPr>
           <a:xfrm>
-            <a:off x="286385" y="1146810"/>
-            <a:ext cx="2743200" cy="400685"/>
+            <a:off x="1264285" y="1209040"/>
+            <a:ext cx="2928620" cy="1265555"/>
           </a:xfrm>
           <a:prstGeom prst="rect">
             <a:avLst/>
@@ -3601,9 +3601,13 @@
         <p:txBody>
           <a:bodyPr rtlCol="0" anchor="ctr"/>
           <a:p>
-            <a:pPr algn="ctr"/>
-            <a:r>
-              <a:rPr lang="en-US" sz="1700">
+            <a:pPr indent="0" algn="ctr" fontAlgn="auto">
+              <a:lnSpc>
+                <a:spcPct val="110000"/>
+              </a:lnSpc>
+            </a:pPr>
+            <a:r>
+              <a:rPr lang="en-US" sz="1600">
                 <a:solidFill>
                   <a:srgbClr val="FFA1A1"/>
                 </a:solidFill>
@@ -3614,7 +3618,7 @@
               <a:t>struct</a:t>
             </a:r>
             <a:r>
-              <a:rPr lang="en-US" sz="1700">
+              <a:rPr lang="en-US" sz="1600">
                 <a:solidFill>
                   <a:schemeClr val="tx1"/>
                 </a:solidFill>
@@ -3626,7 +3630,7 @@
               <a:t> </a:t>
             </a:r>
             <a:r>
-              <a:rPr lang="en-US" sz="1700">
+              <a:rPr lang="en-US" sz="1600">
                 <a:solidFill>
                   <a:srgbClr val="FF0000"/>
                 </a:solidFill>
@@ -3634,9 +3638,9 @@
                 <a:ea typeface="FZHei-B01" panose="03000509000000000000" charset="-122"/>
                 <a:cs typeface="Helvetica Now Display" panose="020B0604030202020204" charset="0"/>
               </a:rPr>
-              <a:t>TensorBase&lt;R, D&gt;</a:t>
-            </a:r>
-            <a:endParaRPr lang="en-US" sz="1700">
+              <a:t>TensorBase&lt;S, D&gt;</a:t>
+            </a:r>
+            <a:endParaRPr lang="en-US" sz="1600">
               <a:solidFill>
                 <a:srgbClr val="FF0000"/>
               </a:solidFill>
@@ -3645,6 +3649,110 @@
               <a:cs typeface="Helvetica Now Display" panose="020B0604030202020204" charset="0"/>
             </a:endParaRPr>
           </a:p>
+          <a:p>
+            <a:pPr indent="0" algn="ctr" fontAlgn="auto">
+              <a:lnSpc>
+                <a:spcPct val="110000"/>
+              </a:lnSpc>
+            </a:pPr>
+            <a:r>
+              <a:rPr lang="en-US" sz="1200">
+                <a:solidFill>
+                  <a:schemeClr val="tx1"/>
+                </a:solidFill>
+                <a:latin typeface="Ubuntu Mono" panose="020B0509030602030204" charset="0"/>
+                <a:ea typeface="FZHei-B01" panose="03000509000000000000" charset="-122"/>
+                <a:cs typeface="Ubuntu Mono" panose="020B0509030602030204" charset="0"/>
+              </a:rPr>
+              <a:t>storage: S</a:t>
+            </a:r>
+            <a:endParaRPr lang="en-US" sz="1200">
+              <a:solidFill>
+                <a:schemeClr val="tx1"/>
+              </a:solidFill>
+              <a:latin typeface="Ubuntu Mono" panose="020B0509030602030204" charset="0"/>
+              <a:ea typeface="FZHei-B01" panose="03000509000000000000" charset="-122"/>
+              <a:cs typeface="Ubuntu Mono" panose="020B0509030602030204" charset="0"/>
+            </a:endParaRPr>
+          </a:p>
+          <a:p>
+            <a:pPr indent="0" algn="ctr" fontAlgn="auto">
+              <a:lnSpc>
+                <a:spcPct val="110000"/>
+              </a:lnSpc>
+            </a:pPr>
+            <a:r>
+              <a:rPr lang="en-US" sz="1200">
+                <a:solidFill>
+                  <a:schemeClr val="tx1"/>
+                </a:solidFill>
+                <a:latin typeface="Ubuntu Mono" panose="020B0509030602030204" charset="0"/>
+                <a:ea typeface="FZHei-B01" panose="03000509000000000000" charset="-122"/>
+                <a:cs typeface="Ubuntu Mono" panose="020B0509030602030204" charset="0"/>
+              </a:rPr>
+              <a:t>layout: D</a:t>
+            </a:r>
+            <a:endParaRPr lang="en-US" sz="1200">
+              <a:solidFill>
+                <a:schemeClr val="tx1"/>
+              </a:solidFill>
+              <a:latin typeface="Ubuntu Mono" panose="020B0509030602030204" charset="0"/>
+              <a:ea typeface="FZHei-B01" panose="03000509000000000000" charset="-122"/>
+              <a:cs typeface="Ubuntu Mono" panose="020B0509030602030204" charset="0"/>
+            </a:endParaRPr>
+          </a:p>
+          <a:p>
+            <a:pPr indent="0" algn="ctr" fontAlgn="auto">
+              <a:lnSpc>
+                <a:spcPct val="110000"/>
+              </a:lnSpc>
+            </a:pPr>
+            <a:r>
+              <a:rPr lang="en-US" sz="1600">
+                <a:solidFill>
+                  <a:srgbClr val="FFA1A1"/>
+                </a:solidFill>
+                <a:latin typeface="Ubuntu Mono" panose="020B0509030602030204" charset="0"/>
+                <a:ea typeface="FZHei-B01" panose="03000509000000000000" charset="-122"/>
+                <a:cs typeface="Ubuntu Mono" panose="020B0509030602030204" charset="0"/>
+                <a:sym typeface="+mn-ea"/>
+              </a:rPr>
+              <a:t>alias</a:t>
+            </a:r>
+            <a:r>
+              <a:rPr lang="en-US" sz="1600">
+                <a:solidFill>
+                  <a:schemeClr val="tx1"/>
+                </a:solidFill>
+                <a:latin typeface="Helvetica Now Display" panose="020B0604030202020204" charset="0"/>
+                <a:ea typeface="FZHei-B01" panose="03000509000000000000" charset="-122"/>
+                <a:cs typeface="Helvetica Now Display" panose="020B0604030202020204" charset="0"/>
+                <a:sym typeface="+mn-ea"/>
+              </a:rPr>
+              <a:t> </a:t>
+            </a:r>
+            <a:r>
+              <a:rPr lang="en-US" sz="1600">
+                <a:solidFill>
+                  <a:srgbClr val="FF0000"/>
+                </a:solidFill>
+                <a:latin typeface="Helvetica Now Display" panose="020B0604030202020204" charset="0"/>
+                <a:ea typeface="FZHei-B01" panose="03000509000000000000" charset="-122"/>
+                <a:cs typeface="Helvetica Now Display" panose="020B0604030202020204" charset="0"/>
+                <a:sym typeface="+mn-ea"/>
+              </a:rPr>
+              <a:t>TensorAny&lt;R, T, B, D&gt;</a:t>
+            </a:r>
+            <a:endParaRPr lang="en-US" sz="1600">
+              <a:solidFill>
+                <a:srgbClr val="FF0000"/>
+              </a:solidFill>
+              <a:latin typeface="Helvetica Now Display" panose="020B0604030202020204" charset="0"/>
+              <a:ea typeface="FZHei-B01" panose="03000509000000000000" charset="-122"/>
+              <a:cs typeface="Helvetica Now Display" panose="020B0604030202020204" charset="0"/>
+              <a:sym typeface="+mn-ea"/>
+            </a:endParaRPr>
+          </a:p>
         </p:txBody>
       </p:sp>
       <p:sp>
@@ -3655,8 +3763,8 @@
         </p:nvSpPr>
         <p:spPr>
           <a:xfrm>
-            <a:off x="286385" y="2048510"/>
-            <a:ext cx="2743200" cy="400685"/>
+            <a:off x="1264285" y="3193415"/>
+            <a:ext cx="2928620" cy="1122045"/>
           </a:xfrm>
           <a:prstGeom prst="rect">
             <a:avLst/>
@@ -3696,9 +3804,13 @@
         <p:txBody>
           <a:bodyPr rtlCol="0" anchor="ctr"/>
           <a:p>
-            <a:pPr algn="ctr"/>
-            <a:r>
-              <a:rPr lang="en-US" sz="1700">
+            <a:pPr indent="0" algn="ctr" fontAlgn="auto">
+              <a:lnSpc>
+                <a:spcPct val="110000"/>
+              </a:lnSpc>
+            </a:pPr>
+            <a:r>
+              <a:rPr lang="en-US" sz="1600">
                 <a:solidFill>
                   <a:srgbClr val="FFA1A1"/>
                 </a:solidFill>
@@ -3709,7 +3821,7 @@
               <a:t>struct</a:t>
             </a:r>
             <a:r>
-              <a:rPr lang="en-US" sz="1700">
+              <a:rPr lang="en-US" sz="1600">
                 <a:solidFill>
                   <a:schemeClr val="tx1"/>
                 </a:solidFill>
@@ -3721,7 +3833,7 @@
               <a:t> </a:t>
             </a:r>
             <a:r>
-              <a:rPr lang="en-US" sz="1700">
+              <a:rPr lang="en-US" sz="1600">
                 <a:solidFill>
                   <a:srgbClr val="FF0000"/>
                 </a:solidFill>
@@ -3731,7 +3843,7 @@
               </a:rPr>
               <a:t>Layout&lt;D&gt;</a:t>
             </a:r>
-            <a:endParaRPr lang="en-US" sz="1700">
+            <a:endParaRPr lang="en-US" sz="1600">
               <a:solidFill>
                 <a:srgbClr val="FF0000"/>
               </a:solidFill>
@@ -3740,18 +3852,101 @@
               <a:cs typeface="Helvetica Now Display" panose="020B0604030202020204" charset="0"/>
             </a:endParaRPr>
           </a:p>
-        </p:txBody>
-      </p:sp>
-      <p:sp>
-        <p:nvSpPr>
-          <p:cNvPr id="6" name="Rectangles 5"/>
+          <a:p>
+            <a:pPr indent="0" algn="ctr" fontAlgn="auto">
+              <a:lnSpc>
+                <a:spcPct val="110000"/>
+              </a:lnSpc>
+            </a:pPr>
+            <a:r>
+              <a:rPr lang="en-US" sz="1200">
+                <a:solidFill>
+                  <a:schemeClr val="tx1"/>
+                </a:solidFill>
+                <a:latin typeface="Ubuntu Mono" panose="020B0509030602030204" charset="0"/>
+                <a:ea typeface="FZHei-B01" panose="03000509000000000000" charset="-122"/>
+                <a:cs typeface="Ubuntu Mono" panose="020B0509030602030204" charset="0"/>
+                <a:sym typeface="+mn-ea"/>
+              </a:rPr>
+              <a:t>shape: Vec&lt;usize&gt;/[usize; N]</a:t>
+            </a:r>
+            <a:endParaRPr lang="en-US" sz="1200">
+              <a:solidFill>
+                <a:schemeClr val="tx1"/>
+              </a:solidFill>
+              <a:latin typeface="Ubuntu Mono" panose="020B0509030602030204" charset="0"/>
+              <a:ea typeface="FZHei-B01" panose="03000509000000000000" charset="-122"/>
+              <a:cs typeface="Ubuntu Mono" panose="020B0509030602030204" charset="0"/>
+            </a:endParaRPr>
+          </a:p>
+          <a:p>
+            <a:pPr indent="0" algn="ctr" fontAlgn="auto">
+              <a:lnSpc>
+                <a:spcPct val="110000"/>
+              </a:lnSpc>
+            </a:pPr>
+            <a:r>
+              <a:rPr lang="en-US" sz="1200">
+                <a:solidFill>
+                  <a:schemeClr val="tx1"/>
+                </a:solidFill>
+                <a:latin typeface="Ubuntu Mono" panose="020B0509030602030204" charset="0"/>
+                <a:ea typeface="FZHei-B01" panose="03000509000000000000" charset="-122"/>
+                <a:cs typeface="Ubuntu Mono" panose="020B0509030602030204" charset="0"/>
+                <a:sym typeface="+mn-ea"/>
+              </a:rPr>
+              <a:t>stride: Vec&lt;isize&gt;/[isize; N]</a:t>
+            </a:r>
+            <a:endParaRPr lang="en-US" sz="1200">
+              <a:solidFill>
+                <a:schemeClr val="tx1"/>
+              </a:solidFill>
+              <a:latin typeface="Ubuntu Mono" panose="020B0509030602030204" charset="0"/>
+              <a:ea typeface="FZHei-B01" panose="03000509000000000000" charset="-122"/>
+              <a:cs typeface="Ubuntu Mono" panose="020B0509030602030204" charset="0"/>
+              <a:sym typeface="+mn-ea"/>
+            </a:endParaRPr>
+          </a:p>
+          <a:p>
+            <a:pPr indent="0" algn="ctr" fontAlgn="auto">
+              <a:lnSpc>
+                <a:spcPct val="110000"/>
+              </a:lnSpc>
+            </a:pPr>
+            <a:r>
+              <a:rPr lang="en-US" sz="1200">
+                <a:solidFill>
+                  <a:schemeClr val="tx1"/>
+                </a:solidFill>
+                <a:latin typeface="Ubuntu Mono" panose="020B0509030602030204" charset="0"/>
+                <a:ea typeface="FZHei-B01" panose="03000509000000000000" charset="-122"/>
+                <a:cs typeface="Ubuntu Mono" panose="020B0509030602030204" charset="0"/>
+                <a:sym typeface="+mn-ea"/>
+              </a:rPr>
+              <a:t>offset: usize</a:t>
+            </a:r>
+            <a:endParaRPr lang="en-US" sz="1200">
+              <a:solidFill>
+                <a:schemeClr val="tx1"/>
+              </a:solidFill>
+              <a:latin typeface="Ubuntu Mono" panose="020B0509030602030204" charset="0"/>
+              <a:ea typeface="FZHei-B01" panose="03000509000000000000" charset="-122"/>
+              <a:cs typeface="Ubuntu Mono" panose="020B0509030602030204" charset="0"/>
+              <a:sym typeface="+mn-ea"/>
+            </a:endParaRPr>
+          </a:p>
+        </p:txBody>
+      </p:sp>
+      <p:sp>
+        <p:nvSpPr>
+          <p:cNvPr id="8" name="Rectangles 7"/>
           <p:cNvSpPr/>
           <p:nvPr/>
         </p:nvSpPr>
         <p:spPr>
           <a:xfrm>
-            <a:off x="286385" y="2950210"/>
-            <a:ext cx="2743200" cy="400685"/>
+            <a:off x="1264285" y="4315460"/>
+            <a:ext cx="2928620" cy="400685"/>
           </a:xfrm>
           <a:prstGeom prst="rect">
             <a:avLst/>
@@ -3791,20 +3986,26 @@
         <p:txBody>
           <a:bodyPr rtlCol="0" anchor="ctr"/>
           <a:p>
-            <a:pPr algn="ctr"/>
-            <a:r>
-              <a:rPr lang="en-US" sz="1700">
-                <a:solidFill>
-                  <a:srgbClr val="FFA1A1"/>
+            <a:pPr indent="0" algn="ctr" fontAlgn="auto">
+              <a:lnSpc>
+                <a:spcPct val="110000"/>
+              </a:lnSpc>
+            </a:pPr>
+            <a:r>
+              <a:rPr lang="en-US" sz="1600">
+                <a:solidFill>
+                  <a:schemeClr val="bg1">
+                    <a:lumMod val="65000"/>
+                  </a:schemeClr>
                 </a:solidFill>
                 <a:latin typeface="Ubuntu Mono" panose="020B0509030602030204" charset="0"/>
                 <a:ea typeface="FZHei-B01" panose="03000509000000000000" charset="-122"/>
                 <a:cs typeface="Ubuntu Mono" panose="020B0509030602030204" charset="0"/>
               </a:rPr>
-              <a:t>abbr</a:t>
-            </a:r>
-            <a:r>
-              <a:rPr lang="en-US" sz="1700">
+              <a:t>trait</a:t>
+            </a:r>
+            <a:r>
+              <a:rPr lang="en-US" sz="1600">
                 <a:solidFill>
                   <a:schemeClr val="tx1"/>
                 </a:solidFill>
@@ -3816,41 +4017,19 @@
               <a:t> </a:t>
             </a:r>
             <a:r>
-              <a:rPr lang="en-US" sz="1700">
-                <a:solidFill>
-                  <a:srgbClr val="FF0000"/>
+              <a:rPr lang="en-US" sz="1600">
+                <a:solidFill>
+                  <a:schemeClr val="tx1"/>
                 </a:solidFill>
                 <a:latin typeface="Helvetica Now Display" panose="020B0604030202020204" charset="0"/>
                 <a:ea typeface="FZHei-B01" panose="03000509000000000000" charset="-122"/>
                 <a:cs typeface="Helvetica Now Display" panose="020B0604030202020204" charset="0"/>
               </a:rPr>
-              <a:t>D</a:t>
-            </a:r>
-            <a:r>
-              <a:rPr lang="en-US" sz="1700">
-                <a:solidFill>
-                  <a:schemeClr val="tx1"/>
-                </a:solidFill>
-                <a:latin typeface="Helvetica Now Display" panose="020B0604030202020204" charset="0"/>
-                <a:ea typeface="FZHei-B01" panose="03000509000000000000" charset="-122"/>
-                <a:cs typeface="Helvetica Now Display" panose="020B0604030202020204" charset="0"/>
-              </a:rPr>
-              <a:t> </a:t>
-            </a:r>
-            <a:r>
-              <a:rPr lang="en-US" sz="1700">
-                <a:solidFill>
-                  <a:srgbClr val="FFA1A1"/>
-                </a:solidFill>
-                <a:latin typeface="Helvetica Now Display" panose="020B0604030202020204" charset="0"/>
-                <a:ea typeface="FZHei-B01" panose="03000509000000000000" charset="-122"/>
-                <a:cs typeface="Helvetica Now Display" panose="020B0604030202020204" charset="0"/>
-              </a:rPr>
-              <a:t>(dimension)</a:t>
-            </a:r>
-            <a:endParaRPr lang="en-US" sz="1700">
+              <a:t>DimAPI</a:t>
+            </a:r>
+            <a:endParaRPr lang="en-US" sz="1600">
               <a:solidFill>
-                <a:srgbClr val="FFA1A1"/>
+                <a:schemeClr val="tx1"/>
               </a:solidFill>
               <a:latin typeface="Helvetica Now Display" panose="020B0604030202020204" charset="0"/>
               <a:ea typeface="FZHei-B01" panose="03000509000000000000" charset="-122"/>
@@ -3859,16 +4038,53 @@
           </a:p>
         </p:txBody>
       </p:sp>
-      <p:sp>
-        <p:nvSpPr>
-          <p:cNvPr id="7" name="Rectangles 6"/>
+      <p:cxnSp>
+        <p:nvCxnSpPr>
+          <p:cNvPr id="9" name="Straight Arrow Connector 8"/>
+          <p:cNvCxnSpPr/>
+          <p:nvPr/>
+        </p:nvCxnSpPr>
+        <p:spPr>
+          <a:xfrm>
+            <a:off x="2728595" y="2475865"/>
+            <a:ext cx="0" cy="316865"/>
+          </a:xfrm>
+          <a:prstGeom prst="straightConnector1">
+            <a:avLst/>
+          </a:prstGeom>
+          <a:ln w="19050">
+            <a:solidFill>
+              <a:schemeClr val="tx1"/>
+            </a:solidFill>
+            <a:round/>
+            <a:tailEnd type="triangle" w="med" len="lg"/>
+          </a:ln>
+        </p:spPr>
+        <p:style>
+          <a:lnRef idx="2">
+            <a:schemeClr val="accent1"/>
+          </a:lnRef>
+          <a:fillRef idx="0">
+            <a:srgbClr val="FFFFFF"/>
+          </a:fillRef>
+          <a:effectRef idx="0">
+            <a:srgbClr val="FFFFFF"/>
+          </a:effectRef>
+          <a:fontRef idx="minor">
+            <a:schemeClr val="tx1"/>
+          </a:fontRef>
+        </p:style>
+      </p:cxnSp>
+      <p:sp>
+        <p:nvSpPr>
+          <p:cNvPr id="11" name="Rectangles 10"/>
           <p:cNvSpPr/>
           <p:nvPr/>
         </p:nvSpPr>
         <p:spPr>
           <a:xfrm>
-            <a:off x="286385" y="3350895"/>
-            <a:ext cx="2743200" cy="400685"/>
+            <a:off x="4411980" y="3364865"/>
+            <a:ext cx="2926080" cy="400685"/>
           </a:xfrm>
           <a:prstGeom prst="rect">
             <a:avLst/>
@@ -3908,22 +4124,24 @@
         <p:txBody>
           <a:bodyPr rtlCol="0" anchor="ctr"/>
           <a:p>
-            <a:pPr algn="ctr"/>
-            <a:r>
-              <a:rPr lang="en-US" sz="1700">
-                <a:solidFill>
-                  <a:schemeClr val="bg1">
-                    <a:lumMod val="65000"/>
-                  </a:schemeClr>
+            <a:pPr indent="0" algn="ctr" fontAlgn="auto">
+              <a:lnSpc>
+                <a:spcPct val="110000"/>
+              </a:lnSpc>
+            </a:pPr>
+            <a:r>
+              <a:rPr lang="en-US" sz="1600">
+                <a:solidFill>
+                  <a:srgbClr val="FFA1A1"/>
                 </a:solidFill>
                 <a:latin typeface="Ubuntu Mono" panose="020B0509030602030204" charset="0"/>
                 <a:ea typeface="FZHei-B01" panose="03000509000000000000" charset="-122"/>
                 <a:cs typeface="Ubuntu Mono" panose="020B0509030602030204" charset="0"/>
               </a:rPr>
-              <a:t>struct</a:t>
-            </a:r>
-            <a:r>
-              <a:rPr lang="en-US" sz="1700">
+              <a:t>abbr</a:t>
+            </a:r>
+            <a:r>
+              <a:rPr lang="en-US" sz="1600">
                 <a:solidFill>
                   <a:schemeClr val="tx1"/>
                 </a:solidFill>
@@ -3935,7 +4153,18 @@
               <a:t> </a:t>
             </a:r>
             <a:r>
-              <a:rPr lang="en-US" sz="1700">
+              <a:rPr lang="en-US" sz="1600">
+                <a:solidFill>
+                  <a:srgbClr val="FF0000"/>
+                </a:solidFill>
+                <a:latin typeface="Helvetica Now Display" panose="020B0604030202020204" charset="0"/>
+                <a:ea typeface="FZHei-B01" panose="03000509000000000000" charset="-122"/>
+                <a:cs typeface="Helvetica Now Display" panose="020B0604030202020204" charset="0"/>
+              </a:rPr>
+              <a:t>R</a:t>
+            </a:r>
+            <a:r>
+              <a:rPr lang="en-US" sz="1600">
                 <a:solidFill>
                   <a:schemeClr val="tx1"/>
                 </a:solidFill>
@@ -3943,11 +4172,22 @@
                 <a:ea typeface="FZHei-B01" panose="03000509000000000000" charset="-122"/>
                 <a:cs typeface="Helvetica Now Display" panose="020B0604030202020204" charset="0"/>
               </a:rPr>
-              <a:t>Ix&lt;N&gt;, IxD</a:t>
-            </a:r>
-            <a:endParaRPr lang="en-US" sz="1700">
+              <a:t> </a:t>
+            </a:r>
+            <a:r>
+              <a:rPr lang="en-US" sz="1600">
+                <a:solidFill>
+                  <a:srgbClr val="FFA1A1"/>
+                </a:solidFill>
+                <a:latin typeface="Helvetica Now Display" panose="020B0604030202020204" charset="0"/>
+                <a:ea typeface="FZHei-B01" panose="03000509000000000000" charset="-122"/>
+                <a:cs typeface="Helvetica Now Display" panose="020B0604030202020204" charset="0"/>
+              </a:rPr>
+              <a:t>(representation)</a:t>
+            </a:r>
+            <a:endParaRPr lang="en-US" sz="1600">
               <a:solidFill>
-                <a:schemeClr val="tx1"/>
+                <a:srgbClr val="FFA1A1"/>
               </a:solidFill>
               <a:latin typeface="Helvetica Now Display" panose="020B0604030202020204" charset="0"/>
               <a:ea typeface="FZHei-B01" panose="03000509000000000000" charset="-122"/>
@@ -3958,14 +4198,14 @@
       </p:sp>
       <p:sp>
         <p:nvSpPr>
-          <p:cNvPr id="8" name="Rectangles 7"/>
+          <p:cNvPr id="12" name="Rectangles 11"/>
           <p:cNvSpPr/>
           <p:nvPr/>
         </p:nvSpPr>
         <p:spPr>
           <a:xfrm>
-            <a:off x="286385" y="3751580"/>
-            <a:ext cx="2743200" cy="400685"/>
+            <a:off x="4411980" y="3765550"/>
+            <a:ext cx="2926080" cy="402336"/>
           </a:xfrm>
           <a:prstGeom prst="rect">
             <a:avLst/>
@@ -4005,9 +4245,114 @@
         <p:txBody>
           <a:bodyPr rtlCol="0" anchor="ctr"/>
           <a:p>
-            <a:pPr algn="ctr"/>
-            <a:r>
-              <a:rPr lang="en-US" sz="1700">
+            <a:pPr indent="0" algn="ctr" fontAlgn="auto">
+              <a:lnSpc>
+                <a:spcPct val="110000"/>
+              </a:lnSpc>
+            </a:pPr>
+            <a:r>
+              <a:rPr lang="en-US" sz="1600">
+                <a:solidFill>
+                  <a:srgbClr val="FFA1A1"/>
+                </a:solidFill>
+                <a:latin typeface="Ubuntu Mono" panose="020B0509030602030204" charset="0"/>
+                <a:ea typeface="FZHei-B01" panose="03000509000000000000" charset="-122"/>
+                <a:cs typeface="Ubuntu Mono" panose="020B0509030602030204" charset="0"/>
+                <a:sym typeface="+mn-ea"/>
+              </a:rPr>
+              <a:t>struct</a:t>
+            </a:r>
+            <a:r>
+              <a:rPr lang="en-US" sz="1600">
+                <a:solidFill>
+                  <a:schemeClr val="tx1"/>
+                </a:solidFill>
+                <a:latin typeface="Helvetica Now Display" panose="020B0604030202020204" charset="0"/>
+                <a:ea typeface="FZHei-B01" panose="03000509000000000000" charset="-122"/>
+                <a:cs typeface="Helvetica Now Display" panose="020B0604030202020204" charset="0"/>
+                <a:sym typeface="+mn-ea"/>
+              </a:rPr>
+              <a:t> </a:t>
+            </a:r>
+            <a:r>
+              <a:rPr lang="en-US" sz="1600">
+                <a:solidFill>
+                  <a:srgbClr val="FF0000"/>
+                </a:solidFill>
+                <a:latin typeface="Helvetica Now Display" panose="020B0604030202020204" charset="0"/>
+                <a:ea typeface="FZHei-B01" panose="03000509000000000000" charset="-122"/>
+                <a:cs typeface="Helvetica Now Display" panose="020B0604030202020204" charset="0"/>
+              </a:rPr>
+              <a:t>Data***&lt;'l, C&gt;</a:t>
+            </a:r>
+            <a:endParaRPr lang="en-US" sz="1200">
+              <a:solidFill>
+                <a:schemeClr val="tx1"/>
+              </a:solidFill>
+              <a:latin typeface="Ubuntu Mono" panose="020B0509030602030204" charset="0"/>
+              <a:ea typeface="FZHei-B01" panose="03000509000000000000" charset="-122"/>
+              <a:cs typeface="Ubuntu Mono" panose="020B0509030602030204" charset="0"/>
+              <a:sym typeface="+mn-ea"/>
+            </a:endParaRPr>
+          </a:p>
+        </p:txBody>
+      </p:sp>
+      <p:sp>
+        <p:nvSpPr>
+          <p:cNvPr id="13" name="Rectangles 12"/>
+          <p:cNvSpPr/>
+          <p:nvPr/>
+        </p:nvSpPr>
+        <p:spPr>
+          <a:xfrm>
+            <a:off x="4411980" y="4168140"/>
+            <a:ext cx="2926080" cy="688340"/>
+          </a:xfrm>
+          <a:prstGeom prst="rect">
+            <a:avLst/>
+          </a:prstGeom>
+          <a:noFill/>
+          <a:ln w="19050">
+            <a:solidFill>
+              <a:schemeClr val="tx1"/>
+            </a:solidFill>
+          </a:ln>
+          <a:extLst>
+            <a:ext uri="{909E8E84-426E-40DD-AFC4-6F175D3DCCD1}">
+              <a14:hiddenFill xmlns:a14="http://schemas.microsoft.com/office/drawing/2010/main">
+                <a:solidFill>
+                  <a:schemeClr val="accent1"/>
+                </a:solidFill>
+              </a14:hiddenFill>
+            </a:ext>
+          </a:extLst>
+        </p:spPr>
+        <p:style>
+          <a:lnRef idx="2">
+            <a:schemeClr val="accent1">
+              <a:lumMod val="75000"/>
+            </a:schemeClr>
+          </a:lnRef>
+          <a:fillRef idx="1">
+            <a:schemeClr val="accent1"/>
+          </a:fillRef>
+          <a:effectRef idx="0">
+            <a:srgbClr val="FFFFFF"/>
+          </a:effectRef>
+          <a:fontRef idx="minor">
+            <a:schemeClr val="lt1"/>
+          </a:fontRef>
+        </p:style>
+        <p:txBody>
+          <a:bodyPr rtlCol="0" anchor="ctr"/>
+          <a:p>
+            <a:pPr indent="0" algn="ctr" fontAlgn="auto">
+              <a:lnSpc>
+                <a:spcPct val="110000"/>
+              </a:lnSpc>
+            </a:pPr>
+            <a:r>
+              <a:rPr lang="en-US" sz="1600">
                 <a:solidFill>
                   <a:schemeClr val="bg1">
                     <a:lumMod val="65000"/>
@@ -4020,7 +4365,7 @@
               <a:t>trait</a:t>
             </a:r>
             <a:r>
-              <a:rPr lang="en-US" sz="1700">
+              <a:rPr lang="en-US" sz="1600">
                 <a:solidFill>
                   <a:schemeClr val="tx1"/>
                 </a:solidFill>
@@ -4032,7 +4377,7 @@
               <a:t> </a:t>
             </a:r>
             <a:r>
-              <a:rPr lang="en-US" sz="1700">
+              <a:rPr lang="en-US" sz="1600">
                 <a:solidFill>
                   <a:schemeClr val="tx1"/>
                 </a:solidFill>
@@ -4040,9 +4385,9 @@
                 <a:ea typeface="FZHei-B01" panose="03000509000000000000" charset="-122"/>
                 <a:cs typeface="Helvetica Now Display" panose="020B0604030202020204" charset="0"/>
               </a:rPr>
-              <a:t>DimAPI</a:t>
-            </a:r>
-            <a:endParaRPr lang="en-US" sz="1700">
+              <a:t>DataAPI&lt;Data = C&gt;</a:t>
+            </a:r>
+            <a:endParaRPr lang="en-US" sz="1600">
               <a:solidFill>
                 <a:schemeClr val="tx1"/>
               </a:solidFill>
@@ -4051,18 +4396,905 @@
               <a:cs typeface="Helvetica Now Display" panose="020B0604030202020204" charset="0"/>
             </a:endParaRPr>
           </a:p>
+          <a:p>
+            <a:pPr indent="0" algn="ctr" fontAlgn="auto">
+              <a:lnSpc>
+                <a:spcPct val="110000"/>
+              </a:lnSpc>
+            </a:pPr>
+            <a:r>
+              <a:rPr lang="en-US" sz="1600">
+                <a:solidFill>
+                  <a:schemeClr val="bg1">
+                    <a:lumMod val="65000"/>
+                  </a:schemeClr>
+                </a:solidFill>
+                <a:latin typeface="Ubuntu Mono" panose="020B0509030602030204" charset="0"/>
+                <a:ea typeface="FZHei-B01" panose="03000509000000000000" charset="-122"/>
+                <a:cs typeface="Ubuntu Mono" panose="020B0509030602030204" charset="0"/>
+                <a:sym typeface="+mn-ea"/>
+              </a:rPr>
+              <a:t>trait</a:t>
+            </a:r>
+            <a:r>
+              <a:rPr lang="en-US" sz="1600">
+                <a:solidFill>
+                  <a:schemeClr val="tx1"/>
+                </a:solidFill>
+                <a:latin typeface="Helvetica Now Display" panose="020B0604030202020204" charset="0"/>
+                <a:ea typeface="FZHei-B01" panose="03000509000000000000" charset="-122"/>
+                <a:cs typeface="Helvetica Now Display" panose="020B0604030202020204" charset="0"/>
+                <a:sym typeface="+mn-ea"/>
+              </a:rPr>
+              <a:t> </a:t>
+            </a:r>
+            <a:r>
+              <a:rPr lang="en-US" sz="1600">
+                <a:solidFill>
+                  <a:schemeClr val="tx1"/>
+                </a:solidFill>
+                <a:latin typeface="Helvetica Now Display" panose="020B0604030202020204" charset="0"/>
+                <a:ea typeface="FZHei-B01" panose="03000509000000000000" charset="-122"/>
+                <a:cs typeface="Helvetica Now Display" panose="020B0604030202020204" charset="0"/>
+              </a:rPr>
+              <a:t>DataMutAPI</a:t>
+            </a:r>
+            <a:endParaRPr lang="en-US" sz="1600">
+              <a:solidFill>
+                <a:schemeClr val="tx1"/>
+              </a:solidFill>
+              <a:latin typeface="Helvetica Now Display" panose="020B0604030202020204" charset="0"/>
+              <a:ea typeface="FZHei-B01" panose="03000509000000000000" charset="-122"/>
+              <a:cs typeface="Helvetica Now Display" panose="020B0604030202020204" charset="0"/>
+            </a:endParaRPr>
+          </a:p>
+        </p:txBody>
+      </p:sp>
+      <p:sp>
+        <p:nvSpPr>
+          <p:cNvPr id="15" name="Rectangles 14"/>
+          <p:cNvSpPr/>
+          <p:nvPr/>
+        </p:nvSpPr>
+        <p:spPr>
+          <a:xfrm>
+            <a:off x="4411980" y="1923415"/>
+            <a:ext cx="2926080" cy="1121410"/>
+          </a:xfrm>
+          <a:prstGeom prst="rect">
+            <a:avLst/>
+          </a:prstGeom>
+          <a:noFill/>
+          <a:ln w="19050">
+            <a:solidFill>
+              <a:schemeClr val="tx1"/>
+            </a:solidFill>
+          </a:ln>
+          <a:extLst>
+            <a:ext uri="{909E8E84-426E-40DD-AFC4-6F175D3DCCD1}">
+              <a14:hiddenFill xmlns:a14="http://schemas.microsoft.com/office/drawing/2010/main">
+                <a:solidFill>
+                  <a:schemeClr val="accent1"/>
+                </a:solidFill>
+              </a14:hiddenFill>
+            </a:ext>
+          </a:extLst>
+        </p:spPr>
+        <p:style>
+          <a:lnRef idx="2">
+            <a:schemeClr val="accent1">
+              <a:lumMod val="75000"/>
+            </a:schemeClr>
+          </a:lnRef>
+          <a:fillRef idx="1">
+            <a:schemeClr val="accent1"/>
+          </a:fillRef>
+          <a:effectRef idx="0">
+            <a:srgbClr val="FFFFFF"/>
+          </a:effectRef>
+          <a:fontRef idx="minor">
+            <a:schemeClr val="lt1"/>
+          </a:fontRef>
+        </p:style>
+        <p:txBody>
+          <a:bodyPr rtlCol="0" anchor="ctr"/>
+          <a:p>
+            <a:pPr indent="0" algn="ctr" fontAlgn="auto">
+              <a:lnSpc>
+                <a:spcPct val="110000"/>
+              </a:lnSpc>
+            </a:pPr>
+            <a:r>
+              <a:rPr lang="en-US" sz="1600">
+                <a:solidFill>
+                  <a:srgbClr val="FFA1A1"/>
+                </a:solidFill>
+                <a:latin typeface="Ubuntu Mono" panose="020B0509030602030204" charset="0"/>
+                <a:ea typeface="FZHei-B01" panose="03000509000000000000" charset="-122"/>
+                <a:cs typeface="Ubuntu Mono" panose="020B0509030602030204" charset="0"/>
+              </a:rPr>
+              <a:t>struct</a:t>
+            </a:r>
+            <a:r>
+              <a:rPr lang="en-US" sz="1600">
+                <a:solidFill>
+                  <a:schemeClr val="tx1"/>
+                </a:solidFill>
+                <a:latin typeface="Helvetica Now Display" panose="020B0604030202020204" charset="0"/>
+                <a:ea typeface="FZHei-B01" panose="03000509000000000000" charset="-122"/>
+                <a:cs typeface="Helvetica Now Display" panose="020B0604030202020204" charset="0"/>
+                <a:sym typeface="+mn-ea"/>
+              </a:rPr>
+              <a:t> </a:t>
+            </a:r>
+            <a:r>
+              <a:rPr lang="en-US" sz="1600">
+                <a:solidFill>
+                  <a:srgbClr val="FF0000"/>
+                </a:solidFill>
+                <a:latin typeface="Helvetica Now Display" panose="020B0604030202020204" charset="0"/>
+                <a:ea typeface="FZHei-B01" panose="03000509000000000000" charset="-122"/>
+                <a:cs typeface="Helvetica Now Display" panose="020B0604030202020204" charset="0"/>
+              </a:rPr>
+              <a:t>Storage&lt;R, T, B&gt;</a:t>
+            </a:r>
+            <a:endParaRPr lang="en-US" sz="1600">
+              <a:solidFill>
+                <a:srgbClr val="FF0000"/>
+              </a:solidFill>
+              <a:latin typeface="Helvetica Now Display" panose="020B0604030202020204" charset="0"/>
+              <a:ea typeface="FZHei-B01" panose="03000509000000000000" charset="-122"/>
+              <a:cs typeface="Helvetica Now Display" panose="020B0604030202020204" charset="0"/>
+            </a:endParaRPr>
+          </a:p>
+          <a:p>
+            <a:pPr indent="0" algn="ctr" fontAlgn="auto">
+              <a:lnSpc>
+                <a:spcPct val="110000"/>
+              </a:lnSpc>
+            </a:pPr>
+            <a:r>
+              <a:rPr lang="en-US" sz="1200">
+                <a:solidFill>
+                  <a:schemeClr val="tx1"/>
+                </a:solidFill>
+                <a:latin typeface="Ubuntu Mono" panose="020B0509030602030204" charset="0"/>
+                <a:ea typeface="FZHei-B01" panose="03000509000000000000" charset="-122"/>
+                <a:cs typeface="Ubuntu Mono" panose="020B0509030602030204" charset="0"/>
+                <a:sym typeface="+mn-ea"/>
+              </a:rPr>
+              <a:t>data: R</a:t>
+            </a:r>
+            <a:endParaRPr lang="en-US" sz="1200">
+              <a:solidFill>
+                <a:schemeClr val="tx1"/>
+              </a:solidFill>
+              <a:latin typeface="Ubuntu Mono" panose="020B0509030602030204" charset="0"/>
+              <a:ea typeface="FZHei-B01" panose="03000509000000000000" charset="-122"/>
+              <a:cs typeface="Ubuntu Mono" panose="020B0509030602030204" charset="0"/>
+            </a:endParaRPr>
+          </a:p>
+          <a:p>
+            <a:pPr indent="0" algn="ctr" fontAlgn="auto">
+              <a:lnSpc>
+                <a:spcPct val="110000"/>
+              </a:lnSpc>
+            </a:pPr>
+            <a:r>
+              <a:rPr lang="en-US" sz="1200">
+                <a:solidFill>
+                  <a:schemeClr val="tx1"/>
+                </a:solidFill>
+                <a:latin typeface="Ubuntu Mono" panose="020B0509030602030204" charset="0"/>
+                <a:ea typeface="FZHei-B01" panose="03000509000000000000" charset="-122"/>
+                <a:cs typeface="Ubuntu Mono" panose="020B0509030602030204" charset="0"/>
+                <a:sym typeface="+mn-ea"/>
+              </a:rPr>
+              <a:t>device: B</a:t>
+            </a:r>
+            <a:endParaRPr lang="en-US" sz="1200">
+              <a:solidFill>
+                <a:schemeClr val="tx1"/>
+              </a:solidFill>
+              <a:latin typeface="Ubuntu Mono" panose="020B0509030602030204" charset="0"/>
+              <a:ea typeface="FZHei-B01" panose="03000509000000000000" charset="-122"/>
+              <a:cs typeface="Ubuntu Mono" panose="020B0509030602030204" charset="0"/>
+              <a:sym typeface="+mn-ea"/>
+            </a:endParaRPr>
+          </a:p>
+          <a:p>
+            <a:pPr indent="0" algn="ctr" fontAlgn="auto">
+              <a:lnSpc>
+                <a:spcPct val="110000"/>
+              </a:lnSpc>
+            </a:pPr>
+            <a:r>
+              <a:rPr lang="en-US" sz="1200">
+                <a:solidFill>
+                  <a:schemeClr val="tx1"/>
+                </a:solidFill>
+                <a:latin typeface="Ubuntu Mono" panose="020B0509030602030204" charset="0"/>
+                <a:ea typeface="FZHei-B01" panose="03000509000000000000" charset="-122"/>
+                <a:cs typeface="Ubuntu Mono" panose="020B0509030602030204" charset="0"/>
+                <a:sym typeface="+mn-ea"/>
+              </a:rPr>
+              <a:t>_phantom: T</a:t>
+            </a:r>
+            <a:endParaRPr lang="en-US" sz="1200">
+              <a:solidFill>
+                <a:schemeClr val="tx1"/>
+              </a:solidFill>
+              <a:latin typeface="Ubuntu Mono" panose="020B0509030602030204" charset="0"/>
+              <a:ea typeface="FZHei-B01" panose="03000509000000000000" charset="-122"/>
+              <a:cs typeface="Ubuntu Mono" panose="020B0509030602030204" charset="0"/>
+              <a:sym typeface="+mn-ea"/>
+            </a:endParaRPr>
+          </a:p>
+        </p:txBody>
+      </p:sp>
+      <p:sp>
+        <p:nvSpPr>
+          <p:cNvPr id="18" name="Rectangles 17"/>
+          <p:cNvSpPr/>
+          <p:nvPr/>
+        </p:nvSpPr>
+        <p:spPr>
+          <a:xfrm>
+            <a:off x="7557135" y="2246630"/>
+            <a:ext cx="2926080" cy="400685"/>
+          </a:xfrm>
+          <a:prstGeom prst="rect">
+            <a:avLst/>
+          </a:prstGeom>
+          <a:noFill/>
+          <a:ln w="19050">
+            <a:solidFill>
+              <a:schemeClr val="tx1"/>
+            </a:solidFill>
+          </a:ln>
+          <a:extLst>
+            <a:ext uri="{909E8E84-426E-40DD-AFC4-6F175D3DCCD1}">
+              <a14:hiddenFill xmlns:a14="http://schemas.microsoft.com/office/drawing/2010/main">
+                <a:solidFill>
+                  <a:schemeClr val="accent1"/>
+                </a:solidFill>
+              </a14:hiddenFill>
+            </a:ext>
+          </a:extLst>
+        </p:spPr>
+        <p:style>
+          <a:lnRef idx="2">
+            <a:schemeClr val="accent1">
+              <a:lumMod val="75000"/>
+            </a:schemeClr>
+          </a:lnRef>
+          <a:fillRef idx="1">
+            <a:schemeClr val="accent1"/>
+          </a:fillRef>
+          <a:effectRef idx="0">
+            <a:srgbClr val="FFFFFF"/>
+          </a:effectRef>
+          <a:fontRef idx="minor">
+            <a:schemeClr val="lt1"/>
+          </a:fontRef>
+        </p:style>
+        <p:txBody>
+          <a:bodyPr rtlCol="0" anchor="ctr"/>
+          <a:p>
+            <a:pPr indent="0" algn="ctr" fontAlgn="auto">
+              <a:lnSpc>
+                <a:spcPct val="110000"/>
+              </a:lnSpc>
+            </a:pPr>
+            <a:r>
+              <a:rPr lang="en-US" sz="1600">
+                <a:solidFill>
+                  <a:srgbClr val="FFA1A1"/>
+                </a:solidFill>
+                <a:latin typeface="Ubuntu Mono" panose="020B0509030602030204" charset="0"/>
+                <a:ea typeface="FZHei-B01" panose="03000509000000000000" charset="-122"/>
+                <a:cs typeface="Ubuntu Mono" panose="020B0509030602030204" charset="0"/>
+              </a:rPr>
+              <a:t>abbr</a:t>
+            </a:r>
+            <a:r>
+              <a:rPr lang="en-US" sz="1600">
+                <a:solidFill>
+                  <a:schemeClr val="tx1"/>
+                </a:solidFill>
+                <a:latin typeface="Helvetica Now Display" panose="020B0604030202020204" charset="0"/>
+                <a:ea typeface="FZHei-B01" panose="03000509000000000000" charset="-122"/>
+                <a:cs typeface="Helvetica Now Display" panose="020B0604030202020204" charset="0"/>
+                <a:sym typeface="+mn-ea"/>
+              </a:rPr>
+              <a:t> </a:t>
+            </a:r>
+            <a:r>
+              <a:rPr lang="en-US" sz="1600">
+                <a:solidFill>
+                  <a:srgbClr val="FF0000"/>
+                </a:solidFill>
+                <a:latin typeface="Helvetica Now Display" panose="020B0604030202020204" charset="0"/>
+                <a:ea typeface="FZHei-B01" panose="03000509000000000000" charset="-122"/>
+                <a:cs typeface="Helvetica Now Display" panose="020B0604030202020204" charset="0"/>
+                <a:sym typeface="+mn-ea"/>
+              </a:rPr>
+              <a:t>B</a:t>
+            </a:r>
+            <a:r>
+              <a:rPr lang="en-US" sz="1600">
+                <a:solidFill>
+                  <a:schemeClr val="tx1"/>
+                </a:solidFill>
+                <a:latin typeface="Helvetica Now Display" panose="020B0604030202020204" charset="0"/>
+                <a:ea typeface="FZHei-B01" panose="03000509000000000000" charset="-122"/>
+                <a:cs typeface="Helvetica Now Display" panose="020B0604030202020204" charset="0"/>
+              </a:rPr>
+              <a:t> </a:t>
+            </a:r>
+            <a:r>
+              <a:rPr lang="en-US" sz="1600">
+                <a:solidFill>
+                  <a:srgbClr val="FFA1A1"/>
+                </a:solidFill>
+                <a:latin typeface="Helvetica Now Display" panose="020B0604030202020204" charset="0"/>
+                <a:ea typeface="FZHei-B01" panose="03000509000000000000" charset="-122"/>
+                <a:cs typeface="Helvetica Now Display" panose="020B0604030202020204" charset="0"/>
+              </a:rPr>
+              <a:t>(backend)</a:t>
+            </a:r>
+            <a:endParaRPr lang="en-US" sz="1600">
+              <a:solidFill>
+                <a:srgbClr val="FFA1A1"/>
+              </a:solidFill>
+              <a:latin typeface="Helvetica Now Display" panose="020B0604030202020204" charset="0"/>
+              <a:ea typeface="FZHei-B01" panose="03000509000000000000" charset="-122"/>
+              <a:cs typeface="Helvetica Now Display" panose="020B0604030202020204" charset="0"/>
+            </a:endParaRPr>
+          </a:p>
+        </p:txBody>
+      </p:sp>
+      <p:sp>
+        <p:nvSpPr>
+          <p:cNvPr id="20" name="Rectangles 19"/>
+          <p:cNvSpPr/>
+          <p:nvPr/>
+        </p:nvSpPr>
+        <p:spPr>
+          <a:xfrm>
+            <a:off x="7557135" y="3364865"/>
+            <a:ext cx="2926080" cy="400685"/>
+          </a:xfrm>
+          <a:prstGeom prst="rect">
+            <a:avLst/>
+          </a:prstGeom>
+          <a:noFill/>
+          <a:ln w="19050">
+            <a:solidFill>
+              <a:schemeClr val="tx1"/>
+            </a:solidFill>
+          </a:ln>
+          <a:extLst>
+            <a:ext uri="{909E8E84-426E-40DD-AFC4-6F175D3DCCD1}">
+              <a14:hiddenFill xmlns:a14="http://schemas.microsoft.com/office/drawing/2010/main">
+                <a:solidFill>
+                  <a:schemeClr val="accent1"/>
+                </a:solidFill>
+              </a14:hiddenFill>
+            </a:ext>
+          </a:extLst>
+        </p:spPr>
+        <p:style>
+          <a:lnRef idx="2">
+            <a:schemeClr val="accent1">
+              <a:lumMod val="75000"/>
+            </a:schemeClr>
+          </a:lnRef>
+          <a:fillRef idx="1">
+            <a:schemeClr val="accent1"/>
+          </a:fillRef>
+          <a:effectRef idx="0">
+            <a:srgbClr val="FFFFFF"/>
+          </a:effectRef>
+          <a:fontRef idx="minor">
+            <a:schemeClr val="lt1"/>
+          </a:fontRef>
+        </p:style>
+        <p:txBody>
+          <a:bodyPr rtlCol="0" anchor="ctr"/>
+          <a:p>
+            <a:pPr indent="0" algn="ctr" fontAlgn="auto">
+              <a:lnSpc>
+                <a:spcPct val="110000"/>
+              </a:lnSpc>
+            </a:pPr>
+            <a:r>
+              <a:rPr lang="en-US" sz="1600">
+                <a:solidFill>
+                  <a:srgbClr val="FFA1A1"/>
+                </a:solidFill>
+                <a:latin typeface="Ubuntu Mono" panose="020B0509030602030204" charset="0"/>
+                <a:ea typeface="FZHei-B01" panose="03000509000000000000" charset="-122"/>
+                <a:cs typeface="Ubuntu Mono" panose="020B0509030602030204" charset="0"/>
+              </a:rPr>
+              <a:t>abbr</a:t>
+            </a:r>
+            <a:r>
+              <a:rPr lang="en-US" sz="1600">
+                <a:solidFill>
+                  <a:schemeClr val="tx1"/>
+                </a:solidFill>
+                <a:latin typeface="Helvetica Now Display" panose="020B0604030202020204" charset="0"/>
+                <a:ea typeface="FZHei-B01" panose="03000509000000000000" charset="-122"/>
+                <a:cs typeface="Helvetica Now Display" panose="020B0604030202020204" charset="0"/>
+                <a:sym typeface="+mn-ea"/>
+              </a:rPr>
+              <a:t> </a:t>
+            </a:r>
+            <a:r>
+              <a:rPr lang="en-US" sz="1600">
+                <a:solidFill>
+                  <a:srgbClr val="FF0000"/>
+                </a:solidFill>
+                <a:latin typeface="Helvetica Now Display" panose="020B0604030202020204" charset="0"/>
+                <a:ea typeface="FZHei-B01" panose="03000509000000000000" charset="-122"/>
+                <a:cs typeface="Helvetica Now Display" panose="020B0604030202020204" charset="0"/>
+              </a:rPr>
+              <a:t>T</a:t>
+            </a:r>
+            <a:r>
+              <a:rPr lang="en-US" sz="1600">
+                <a:solidFill>
+                  <a:schemeClr val="tx1"/>
+                </a:solidFill>
+                <a:latin typeface="Helvetica Now Display" panose="020B0604030202020204" charset="0"/>
+                <a:ea typeface="FZHei-B01" panose="03000509000000000000" charset="-122"/>
+                <a:cs typeface="Helvetica Now Display" panose="020B0604030202020204" charset="0"/>
+              </a:rPr>
+              <a:t> </a:t>
+            </a:r>
+            <a:r>
+              <a:rPr lang="en-US" sz="1600">
+                <a:solidFill>
+                  <a:srgbClr val="FFA1A1"/>
+                </a:solidFill>
+                <a:latin typeface="Helvetica Now Display" panose="020B0604030202020204" charset="0"/>
+                <a:ea typeface="FZHei-B01" panose="03000509000000000000" charset="-122"/>
+                <a:cs typeface="Helvetica Now Display" panose="020B0604030202020204" charset="0"/>
+              </a:rPr>
+              <a:t>(data type)</a:t>
+            </a:r>
+            <a:endParaRPr lang="en-US" sz="1600">
+              <a:solidFill>
+                <a:srgbClr val="FFA1A1"/>
+              </a:solidFill>
+              <a:latin typeface="Helvetica Now Display" panose="020B0604030202020204" charset="0"/>
+              <a:ea typeface="FZHei-B01" panose="03000509000000000000" charset="-122"/>
+              <a:cs typeface="Helvetica Now Display" panose="020B0604030202020204" charset="0"/>
+            </a:endParaRPr>
+          </a:p>
+        </p:txBody>
+      </p:sp>
+      <p:sp>
+        <p:nvSpPr>
+          <p:cNvPr id="26" name="Rectangles 25"/>
+          <p:cNvSpPr/>
+          <p:nvPr/>
+        </p:nvSpPr>
+        <p:spPr>
+          <a:xfrm>
+            <a:off x="4411980" y="5176520"/>
+            <a:ext cx="2926080" cy="839470"/>
+          </a:xfrm>
+          <a:prstGeom prst="rect">
+            <a:avLst/>
+          </a:prstGeom>
+          <a:noFill/>
+          <a:ln w="19050">
+            <a:solidFill>
+              <a:schemeClr val="tx1"/>
+            </a:solidFill>
+          </a:ln>
+          <a:extLst>
+            <a:ext uri="{909E8E84-426E-40DD-AFC4-6F175D3DCCD1}">
+              <a14:hiddenFill xmlns:a14="http://schemas.microsoft.com/office/drawing/2010/main">
+                <a:solidFill>
+                  <a:schemeClr val="accent1"/>
+                </a:solidFill>
+              </a14:hiddenFill>
+            </a:ext>
+          </a:extLst>
+        </p:spPr>
+        <p:style>
+          <a:lnRef idx="2">
+            <a:schemeClr val="accent1">
+              <a:lumMod val="75000"/>
+            </a:schemeClr>
+          </a:lnRef>
+          <a:fillRef idx="1">
+            <a:schemeClr val="accent1"/>
+          </a:fillRef>
+          <a:effectRef idx="0">
+            <a:srgbClr val="FFFFFF"/>
+          </a:effectRef>
+          <a:fontRef idx="minor">
+            <a:schemeClr val="lt1"/>
+          </a:fontRef>
+        </p:style>
+        <p:txBody>
+          <a:bodyPr rtlCol="0" anchor="ctr"/>
+          <a:p>
+            <a:pPr indent="0" algn="ctr" fontAlgn="auto">
+              <a:lnSpc>
+                <a:spcPct val="110000"/>
+              </a:lnSpc>
+            </a:pPr>
+            <a:r>
+              <a:rPr lang="en-US" sz="1600">
+                <a:solidFill>
+                  <a:srgbClr val="FFA1A1"/>
+                </a:solidFill>
+                <a:latin typeface="Ubuntu Mono" panose="020B0509030602030204" charset="0"/>
+                <a:ea typeface="FZHei-B01" panose="03000509000000000000" charset="-122"/>
+                <a:cs typeface="Ubuntu Mono" panose="020B0509030602030204" charset="0"/>
+              </a:rPr>
+              <a:t>lifetime</a:t>
+            </a:r>
+            <a:r>
+              <a:rPr lang="en-US" sz="1600">
+                <a:solidFill>
+                  <a:schemeClr val="tx1"/>
+                </a:solidFill>
+                <a:latin typeface="Helvetica Now Display" panose="020B0604030202020204" charset="0"/>
+                <a:ea typeface="FZHei-B01" panose="03000509000000000000" charset="-122"/>
+                <a:cs typeface="Helvetica Now Display" panose="020B0604030202020204" charset="0"/>
+                <a:sym typeface="+mn-ea"/>
+              </a:rPr>
+              <a:t> </a:t>
+            </a:r>
+            <a:r>
+              <a:rPr lang="en-US" sz="1600">
+                <a:solidFill>
+                  <a:srgbClr val="FF0000"/>
+                </a:solidFill>
+                <a:latin typeface="Helvetica Now Display" panose="020B0604030202020204" charset="0"/>
+                <a:ea typeface="FZHei-B01" panose="03000509000000000000" charset="-122"/>
+                <a:cs typeface="Helvetica Now Display" panose="020B0604030202020204" charset="0"/>
+              </a:rPr>
+              <a:t>'l</a:t>
+            </a:r>
+            <a:endParaRPr lang="en-US" sz="1600">
+              <a:solidFill>
+                <a:srgbClr val="FF0000"/>
+              </a:solidFill>
+              <a:latin typeface="Helvetica Now Display" panose="020B0604030202020204" charset="0"/>
+              <a:ea typeface="FZHei-B01" panose="03000509000000000000" charset="-122"/>
+              <a:cs typeface="Helvetica Now Display" panose="020B0604030202020204" charset="0"/>
+            </a:endParaRPr>
+          </a:p>
+          <a:p>
+            <a:pPr indent="0" algn="ctr" fontAlgn="auto">
+              <a:lnSpc>
+                <a:spcPct val="110000"/>
+              </a:lnSpc>
+            </a:pPr>
+            <a:r>
+              <a:rPr lang="en-US" sz="1200">
+                <a:solidFill>
+                  <a:schemeClr val="tx1"/>
+                </a:solidFill>
+                <a:latin typeface="Ubuntu Mono" panose="020B0509030602030204" charset="0"/>
+                <a:ea typeface="FZHei-B01" panose="03000509000000000000" charset="-122"/>
+                <a:cs typeface="Ubuntu Mono" panose="020B0509030602030204" charset="0"/>
+                <a:sym typeface="+mn-ea"/>
+              </a:rPr>
+              <a:t>DataOwned/DataArc&lt;C&gt;</a:t>
+            </a:r>
+            <a:endParaRPr lang="en-US" sz="1200">
+              <a:solidFill>
+                <a:schemeClr val="tx1"/>
+              </a:solidFill>
+              <a:latin typeface="Ubuntu Mono" panose="020B0509030602030204" charset="0"/>
+              <a:ea typeface="FZHei-B01" panose="03000509000000000000" charset="-122"/>
+              <a:cs typeface="Ubuntu Mono" panose="020B0509030602030204" charset="0"/>
+              <a:sym typeface="+mn-ea"/>
+            </a:endParaRPr>
+          </a:p>
+          <a:p>
+            <a:pPr indent="0" algn="ctr" fontAlgn="auto">
+              <a:lnSpc>
+                <a:spcPct val="110000"/>
+              </a:lnSpc>
+            </a:pPr>
+            <a:r>
+              <a:rPr lang="en-US" sz="1200">
+                <a:solidFill>
+                  <a:schemeClr val="tx1"/>
+                </a:solidFill>
+                <a:latin typeface="Ubuntu Mono" panose="020B0509030602030204" charset="0"/>
+                <a:ea typeface="FZHei-B01" panose="03000509000000000000" charset="-122"/>
+                <a:cs typeface="Ubuntu Mono" panose="020B0509030602030204" charset="0"/>
+                <a:sym typeface="+mn-ea"/>
+              </a:rPr>
+              <a:t>DataRef/DataMut/DataCow&lt;'l, C&gt;</a:t>
+            </a:r>
+            <a:endParaRPr lang="en-US" sz="1200">
+              <a:solidFill>
+                <a:schemeClr val="tx1"/>
+              </a:solidFill>
+              <a:latin typeface="Ubuntu Mono" panose="020B0509030602030204" charset="0"/>
+              <a:ea typeface="FZHei-B01" panose="03000509000000000000" charset="-122"/>
+              <a:cs typeface="Ubuntu Mono" panose="020B0509030602030204" charset="0"/>
+              <a:sym typeface="+mn-ea"/>
+            </a:endParaRPr>
+          </a:p>
+        </p:txBody>
+      </p:sp>
+      <p:sp>
+        <p:nvSpPr>
+          <p:cNvPr id="33" name="Rectangles 32"/>
+          <p:cNvSpPr/>
+          <p:nvPr/>
+        </p:nvSpPr>
+        <p:spPr>
+          <a:xfrm>
+            <a:off x="7557135" y="2647315"/>
+            <a:ext cx="2926080" cy="400685"/>
+          </a:xfrm>
+          <a:prstGeom prst="rect">
+            <a:avLst/>
+          </a:prstGeom>
+          <a:noFill/>
+          <a:ln w="19050">
+            <a:solidFill>
+              <a:schemeClr val="tx1"/>
+            </a:solidFill>
+          </a:ln>
+          <a:extLst>
+            <a:ext uri="{909E8E84-426E-40DD-AFC4-6F175D3DCCD1}">
+              <a14:hiddenFill xmlns:a14="http://schemas.microsoft.com/office/drawing/2010/main">
+                <a:solidFill>
+                  <a:schemeClr val="accent1"/>
+                </a:solidFill>
+              </a14:hiddenFill>
+            </a:ext>
+          </a:extLst>
+        </p:spPr>
+        <p:style>
+          <a:lnRef idx="2">
+            <a:schemeClr val="accent1">
+              <a:lumMod val="75000"/>
+            </a:schemeClr>
+          </a:lnRef>
+          <a:fillRef idx="1">
+            <a:schemeClr val="accent1"/>
+          </a:fillRef>
+          <a:effectRef idx="0">
+            <a:srgbClr val="FFFFFF"/>
+          </a:effectRef>
+          <a:fontRef idx="minor">
+            <a:schemeClr val="lt1"/>
+          </a:fontRef>
+        </p:style>
+        <p:txBody>
+          <a:bodyPr rtlCol="0" anchor="ctr"/>
+          <a:p>
+            <a:pPr indent="0" algn="ctr" fontAlgn="auto">
+              <a:lnSpc>
+                <a:spcPct val="110000"/>
+              </a:lnSpc>
+            </a:pPr>
+            <a:r>
+              <a:rPr lang="en-US" sz="1600">
+                <a:solidFill>
+                  <a:schemeClr val="bg1">
+                    <a:lumMod val="65000"/>
+                  </a:schemeClr>
+                </a:solidFill>
+                <a:latin typeface="Ubuntu Mono" panose="020B0509030602030204" charset="0"/>
+                <a:ea typeface="FZHei-B01" panose="03000509000000000000" charset="-122"/>
+                <a:cs typeface="Ubuntu Mono" panose="020B0509030602030204" charset="0"/>
+                <a:sym typeface="+mn-ea"/>
+              </a:rPr>
+              <a:t>trait</a:t>
+            </a:r>
+            <a:r>
+              <a:rPr lang="en-US" sz="1600">
+                <a:solidFill>
+                  <a:schemeClr val="tx1"/>
+                </a:solidFill>
+                <a:latin typeface="Helvetica Now Display" panose="020B0604030202020204" charset="0"/>
+                <a:ea typeface="FZHei-B01" panose="03000509000000000000" charset="-122"/>
+                <a:cs typeface="Helvetica Now Display" panose="020B0604030202020204" charset="0"/>
+                <a:sym typeface="+mn-ea"/>
+              </a:rPr>
+              <a:t> DeviceAPI&lt;T&gt;</a:t>
+            </a:r>
+            <a:endParaRPr lang="en-US" sz="1600">
+              <a:solidFill>
+                <a:schemeClr val="tx1"/>
+              </a:solidFill>
+              <a:latin typeface="Helvetica Now Display" panose="020B0604030202020204" charset="0"/>
+              <a:ea typeface="FZHei-B01" panose="03000509000000000000" charset="-122"/>
+              <a:cs typeface="Helvetica Now Display" panose="020B0604030202020204" charset="0"/>
+              <a:sym typeface="+mn-ea"/>
+            </a:endParaRPr>
+          </a:p>
         </p:txBody>
       </p:sp>
       <p:cxnSp>
         <p:nvCxnSpPr>
-          <p:cNvPr id="9" name="Straight Arrow Connector 8"/>
+          <p:cNvPr id="14" name="Straight Arrow Connector 13"/>
           <p:cNvCxnSpPr/>
           <p:nvPr/>
         </p:nvCxnSpPr>
         <p:spPr>
           <a:xfrm>
-            <a:off x="1657985" y="1547495"/>
-            <a:ext cx="0" cy="501015"/>
+            <a:off x="5875020" y="3044825"/>
+            <a:ext cx="0" cy="320040"/>
+          </a:xfrm>
+          <a:prstGeom prst="straightConnector1">
+            <a:avLst/>
+          </a:prstGeom>
+          <a:ln w="19050">
+            <a:solidFill>
+              <a:schemeClr val="tx1"/>
+            </a:solidFill>
+            <a:round/>
+            <a:tailEnd type="triangle" w="med" len="lg"/>
+          </a:ln>
+        </p:spPr>
+        <p:style>
+          <a:lnRef idx="2">
+            <a:schemeClr val="accent1"/>
+          </a:lnRef>
+          <a:fillRef idx="0">
+            <a:srgbClr val="FFFFFF"/>
+          </a:fillRef>
+          <a:effectRef idx="0">
+            <a:srgbClr val="FFFFFF"/>
+          </a:effectRef>
+          <a:fontRef idx="minor">
+            <a:schemeClr val="tx1"/>
+          </a:fontRef>
+        </p:style>
+      </p:cxnSp>
+      <p:sp>
+        <p:nvSpPr>
+          <p:cNvPr id="23" name="Rectangles 22"/>
+          <p:cNvSpPr/>
+          <p:nvPr/>
+        </p:nvSpPr>
+        <p:spPr>
+          <a:xfrm>
+            <a:off x="1264285" y="2792730"/>
+            <a:ext cx="2928620" cy="400685"/>
+          </a:xfrm>
+          <a:prstGeom prst="rect">
+            <a:avLst/>
+          </a:prstGeom>
+          <a:noFill/>
+          <a:ln w="19050">
+            <a:solidFill>
+              <a:schemeClr val="tx1"/>
+            </a:solidFill>
+          </a:ln>
+          <a:extLst>
+            <a:ext uri="{909E8E84-426E-40DD-AFC4-6F175D3DCCD1}">
+              <a14:hiddenFill xmlns:a14="http://schemas.microsoft.com/office/drawing/2010/main">
+                <a:solidFill>
+                  <a:schemeClr val="accent1"/>
+                </a:solidFill>
+              </a14:hiddenFill>
+            </a:ext>
+          </a:extLst>
+        </p:spPr>
+        <p:style>
+          <a:lnRef idx="2">
+            <a:schemeClr val="accent1">
+              <a:lumMod val="75000"/>
+            </a:schemeClr>
+          </a:lnRef>
+          <a:fillRef idx="1">
+            <a:schemeClr val="accent1"/>
+          </a:fillRef>
+          <a:effectRef idx="0">
+            <a:srgbClr val="FFFFFF"/>
+          </a:effectRef>
+          <a:fontRef idx="minor">
+            <a:schemeClr val="lt1"/>
+          </a:fontRef>
+        </p:style>
+        <p:txBody>
+          <a:bodyPr rtlCol="0" anchor="ctr"/>
+          <a:p>
+            <a:pPr indent="0" algn="ctr" fontAlgn="auto">
+              <a:lnSpc>
+                <a:spcPct val="110000"/>
+              </a:lnSpc>
+            </a:pPr>
+            <a:r>
+              <a:rPr lang="en-US" sz="1600">
+                <a:solidFill>
+                  <a:srgbClr val="FFA1A1"/>
+                </a:solidFill>
+                <a:latin typeface="Ubuntu Mono" panose="020B0509030602030204" charset="0"/>
+                <a:ea typeface="FZHei-B01" panose="03000509000000000000" charset="-122"/>
+                <a:cs typeface="Ubuntu Mono" panose="020B0509030602030204" charset="0"/>
+                <a:sym typeface="+mn-ea"/>
+              </a:rPr>
+              <a:t>abbr</a:t>
+            </a:r>
+            <a:r>
+              <a:rPr lang="en-US" sz="1600">
+                <a:solidFill>
+                  <a:schemeClr val="tx1"/>
+                </a:solidFill>
+                <a:latin typeface="Helvetica Now Display" panose="020B0604030202020204" charset="0"/>
+                <a:ea typeface="FZHei-B01" panose="03000509000000000000" charset="-122"/>
+                <a:cs typeface="Helvetica Now Display" panose="020B0604030202020204" charset="0"/>
+                <a:sym typeface="+mn-ea"/>
+              </a:rPr>
+              <a:t> </a:t>
+            </a:r>
+            <a:r>
+              <a:rPr lang="en-US" sz="1600">
+                <a:solidFill>
+                  <a:srgbClr val="FF0000"/>
+                </a:solidFill>
+                <a:latin typeface="Helvetica Now Display" panose="020B0604030202020204" charset="0"/>
+                <a:ea typeface="FZHei-B01" panose="03000509000000000000" charset="-122"/>
+                <a:cs typeface="Helvetica Now Display" panose="020B0604030202020204" charset="0"/>
+                <a:sym typeface="+mn-ea"/>
+              </a:rPr>
+              <a:t>D</a:t>
+            </a:r>
+            <a:r>
+              <a:rPr lang="en-US" sz="1600">
+                <a:solidFill>
+                  <a:schemeClr val="tx1"/>
+                </a:solidFill>
+                <a:latin typeface="Helvetica Now Display" panose="020B0604030202020204" charset="0"/>
+                <a:ea typeface="FZHei-B01" panose="03000509000000000000" charset="-122"/>
+                <a:cs typeface="Helvetica Now Display" panose="020B0604030202020204" charset="0"/>
+                <a:sym typeface="+mn-ea"/>
+              </a:rPr>
+              <a:t> </a:t>
+            </a:r>
+            <a:r>
+              <a:rPr lang="en-US" sz="1600">
+                <a:solidFill>
+                  <a:srgbClr val="FFA1A1"/>
+                </a:solidFill>
+                <a:latin typeface="Helvetica Now Display" panose="020B0604030202020204" charset="0"/>
+                <a:ea typeface="FZHei-B01" panose="03000509000000000000" charset="-122"/>
+                <a:cs typeface="Helvetica Now Display" panose="020B0604030202020204" charset="0"/>
+                <a:sym typeface="+mn-ea"/>
+              </a:rPr>
+              <a:t>(dimension)</a:t>
+            </a:r>
+            <a:endParaRPr lang="en-US" sz="1600">
+              <a:solidFill>
+                <a:srgbClr val="FFA1A1"/>
+              </a:solidFill>
+              <a:latin typeface="Helvetica Now Display" panose="020B0604030202020204" charset="0"/>
+              <a:ea typeface="FZHei-B01" panose="03000509000000000000" charset="-122"/>
+              <a:cs typeface="Helvetica Now Display" panose="020B0604030202020204" charset="0"/>
+              <a:sym typeface="+mn-ea"/>
+            </a:endParaRPr>
+          </a:p>
+        </p:txBody>
+      </p:sp>
+      <p:cxnSp>
+        <p:nvCxnSpPr>
+          <p:cNvPr id="35" name="Straight Arrow Connector 34"/>
+          <p:cNvCxnSpPr/>
+          <p:nvPr/>
+        </p:nvCxnSpPr>
+        <p:spPr>
+          <a:xfrm>
+            <a:off x="5875020" y="4856480"/>
+            <a:ext cx="0" cy="320040"/>
           </a:xfrm>
           <a:prstGeom prst="straightConnector1">
             <a:avLst/>
@@ -4092,14 +5324,14 @@
       </p:cxnSp>
       <p:cxnSp>
         <p:nvCxnSpPr>
-          <p:cNvPr id="10" name="Straight Arrow Connector 9"/>
+          <p:cNvPr id="38" name="Straight Arrow Connector 37"/>
           <p:cNvCxnSpPr/>
           <p:nvPr/>
         </p:nvCxnSpPr>
         <p:spPr>
           <a:xfrm>
-            <a:off x="1657985" y="2449195"/>
-            <a:ext cx="0" cy="501015"/>
+            <a:off x="4192905" y="1007745"/>
+            <a:ext cx="1682115" cy="507365"/>
           </a:xfrm>
           <a:prstGeom prst="straightConnector1">
             <a:avLst/>
@@ -4129,14 +5361,14 @@
       </p:cxnSp>
       <p:sp>
         <p:nvSpPr>
-          <p:cNvPr id="11" name="Rectangles 10"/>
+          <p:cNvPr id="39" name="Rectangles 38"/>
           <p:cNvSpPr/>
           <p:nvPr/>
         </p:nvSpPr>
         <p:spPr>
           <a:xfrm>
-            <a:off x="3255645" y="2048510"/>
-            <a:ext cx="2743200" cy="400685"/>
+            <a:off x="4411980" y="1522730"/>
+            <a:ext cx="2926080" cy="400685"/>
           </a:xfrm>
           <a:prstGeom prst="rect">
             <a:avLst/>
@@ -4176,9 +5408,13 @@
         <p:txBody>
           <a:bodyPr rtlCol="0" anchor="ctr"/>
           <a:p>
-            <a:pPr algn="ctr"/>
-            <a:r>
-              <a:rPr lang="en-US" sz="1700">
+            <a:pPr indent="0" algn="ctr" fontAlgn="auto">
+              <a:lnSpc>
+                <a:spcPct val="110000"/>
+              </a:lnSpc>
+            </a:pPr>
+            <a:r>
+              <a:rPr lang="en-US" sz="1600">
                 <a:solidFill>
                   <a:srgbClr val="FFA1A1"/>
                 </a:solidFill>
@@ -4189,7 +5425,7 @@
               <a:t>abbr</a:t>
             </a:r>
             <a:r>
-              <a:rPr lang="en-US" sz="1700">
+              <a:rPr lang="en-US" sz="1600">
                 <a:solidFill>
                   <a:schemeClr val="tx1"/>
                 </a:solidFill>
@@ -4201,7 +5437,7 @@
               <a:t> </a:t>
             </a:r>
             <a:r>
-              <a:rPr lang="en-US" sz="1700">
+              <a:rPr lang="en-US" sz="1600">
                 <a:solidFill>
                   <a:srgbClr val="FF0000"/>
                 </a:solidFill>
@@ -4209,10 +5445,10 @@
                 <a:ea typeface="FZHei-B01" panose="03000509000000000000" charset="-122"/>
                 <a:cs typeface="Helvetica Now Display" panose="020B0604030202020204" charset="0"/>
               </a:rPr>
-              <a:t>R</a:t>
-            </a:r>
-            <a:r>
-              <a:rPr lang="en-US" sz="1700">
+              <a:t>S</a:t>
+            </a:r>
+            <a:r>
+              <a:rPr lang="en-US" sz="1600">
                 <a:solidFill>
                   <a:schemeClr val="tx1"/>
                 </a:solidFill>
@@ -4223,7 +5459,7 @@
               <a:t> </a:t>
             </a:r>
             <a:r>
-              <a:rPr lang="en-US" sz="1700">
+              <a:rPr lang="en-US" sz="1600">
                 <a:solidFill>
                   <a:srgbClr val="FFA1A1"/>
                 </a:solidFill>
@@ -4231,9 +5467,9 @@
                 <a:ea typeface="FZHei-B01" panose="03000509000000000000" charset="-122"/>
                 <a:cs typeface="Helvetica Now Display" panose="020B0604030202020204" charset="0"/>
               </a:rPr>
-              <a:t>(representation)</a:t>
-            </a:r>
-            <a:endParaRPr lang="en-US" sz="1700">
+              <a:t>(storage)</a:t>
+            </a:r>
+            <a:endParaRPr lang="en-US" sz="1600">
               <a:solidFill>
                 <a:srgbClr val="FFA1A1"/>
               </a:solidFill>
@@ -4244,1168 +5480,16 @@
           </a:p>
         </p:txBody>
       </p:sp>
-      <p:sp>
-        <p:nvSpPr>
-          <p:cNvPr id="12" name="Rectangles 11"/>
-          <p:cNvSpPr/>
-          <p:nvPr/>
-        </p:nvSpPr>
-        <p:spPr>
-          <a:xfrm>
-            <a:off x="3255645" y="2449195"/>
-            <a:ext cx="2743200" cy="400685"/>
-          </a:xfrm>
-          <a:prstGeom prst="rect">
-            <a:avLst/>
-          </a:prstGeom>
-          <a:noFill/>
-          <a:ln w="19050">
-            <a:solidFill>
-              <a:schemeClr val="tx1"/>
-            </a:solidFill>
-          </a:ln>
-          <a:extLst>
-            <a:ext uri="{909E8E84-426E-40DD-AFC4-6F175D3DCCD1}">
-              <a14:hiddenFill xmlns:a14="http://schemas.microsoft.com/office/drawing/2010/main">
-                <a:solidFill>
-                  <a:schemeClr val="accent1"/>
-                </a:solidFill>
-              </a14:hiddenFill>
-            </a:ext>
-          </a:extLst>
-        </p:spPr>
-        <p:style>
-          <a:lnRef idx="2">
-            <a:schemeClr val="accent1">
-              <a:lumMod val="75000"/>
-            </a:schemeClr>
-          </a:lnRef>
-          <a:fillRef idx="1">
-            <a:schemeClr val="accent1"/>
-          </a:fillRef>
-          <a:effectRef idx="0">
-            <a:srgbClr val="FFFFFF"/>
-          </a:effectRef>
-          <a:fontRef idx="minor">
-            <a:schemeClr val="lt1"/>
-          </a:fontRef>
-        </p:style>
-        <p:txBody>
-          <a:bodyPr rtlCol="0" anchor="ctr"/>
-          <a:p>
-            <a:pPr algn="ctr"/>
-            <a:r>
-              <a:rPr lang="en-US" sz="1700">
-                <a:solidFill>
-                  <a:schemeClr val="bg1">
-                    <a:lumMod val="65000"/>
-                  </a:schemeClr>
-                </a:solidFill>
-                <a:latin typeface="Ubuntu Mono" panose="020B0509030602030204" charset="0"/>
-                <a:ea typeface="FZHei-B01" panose="03000509000000000000" charset="-122"/>
-                <a:cs typeface="Ubuntu Mono" panose="020B0509030602030204" charset="0"/>
-              </a:rPr>
-              <a:t>struct</a:t>
-            </a:r>
-            <a:r>
-              <a:rPr lang="en-US" sz="1700">
-                <a:solidFill>
-                  <a:schemeClr val="tx1"/>
-                </a:solidFill>
-                <a:latin typeface="Helvetica Now Display" panose="020B0604030202020204" charset="0"/>
-                <a:ea typeface="FZHei-B01" panose="03000509000000000000" charset="-122"/>
-                <a:cs typeface="Helvetica Now Display" panose="020B0604030202020204" charset="0"/>
-                <a:sym typeface="+mn-ea"/>
-              </a:rPr>
-              <a:t> </a:t>
-            </a:r>
-            <a:r>
-              <a:rPr lang="en-US" sz="1700">
-                <a:solidFill>
-                  <a:schemeClr val="tx1"/>
-                </a:solidFill>
-                <a:latin typeface="Helvetica Now Display" panose="020B0604030202020204" charset="0"/>
-                <a:ea typeface="FZHei-B01" panose="03000509000000000000" charset="-122"/>
-                <a:cs typeface="Helvetica Now Display" panose="020B0604030202020204" charset="0"/>
-              </a:rPr>
-              <a:t>Data***&lt;'l, S&gt;</a:t>
-            </a:r>
-            <a:endParaRPr lang="en-US" sz="1700">
-              <a:solidFill>
-                <a:schemeClr val="tx1"/>
-              </a:solidFill>
-              <a:latin typeface="Helvetica Now Display" panose="020B0604030202020204" charset="0"/>
-              <a:ea typeface="FZHei-B01" panose="03000509000000000000" charset="-122"/>
-              <a:cs typeface="Helvetica Now Display" panose="020B0604030202020204" charset="0"/>
-            </a:endParaRPr>
-          </a:p>
-        </p:txBody>
-      </p:sp>
-      <p:sp>
-        <p:nvSpPr>
-          <p:cNvPr id="13" name="Rectangles 12"/>
-          <p:cNvSpPr/>
-          <p:nvPr/>
-        </p:nvSpPr>
-        <p:spPr>
-          <a:xfrm>
-            <a:off x="3255645" y="2849880"/>
-            <a:ext cx="2743200" cy="688340"/>
-          </a:xfrm>
-          <a:prstGeom prst="rect">
-            <a:avLst/>
-          </a:prstGeom>
-          <a:noFill/>
-          <a:ln w="19050">
-            <a:solidFill>
-              <a:schemeClr val="tx1"/>
-            </a:solidFill>
-          </a:ln>
-          <a:extLst>
-            <a:ext uri="{909E8E84-426E-40DD-AFC4-6F175D3DCCD1}">
-              <a14:hiddenFill xmlns:a14="http://schemas.microsoft.com/office/drawing/2010/main">
-                <a:solidFill>
-                  <a:schemeClr val="accent1"/>
-                </a:solidFill>
-              </a14:hiddenFill>
-            </a:ext>
-          </a:extLst>
-        </p:spPr>
-        <p:style>
-          <a:lnRef idx="2">
-            <a:schemeClr val="accent1">
-              <a:lumMod val="75000"/>
-            </a:schemeClr>
-          </a:lnRef>
-          <a:fillRef idx="1">
-            <a:schemeClr val="accent1"/>
-          </a:fillRef>
-          <a:effectRef idx="0">
-            <a:srgbClr val="FFFFFF"/>
-          </a:effectRef>
-          <a:fontRef idx="minor">
-            <a:schemeClr val="lt1"/>
-          </a:fontRef>
-        </p:style>
-        <p:txBody>
-          <a:bodyPr rtlCol="0" anchor="ctr"/>
-          <a:p>
-            <a:pPr algn="ctr"/>
-            <a:r>
-              <a:rPr lang="en-US" sz="1700">
-                <a:solidFill>
-                  <a:schemeClr val="bg1">
-                    <a:lumMod val="65000"/>
-                  </a:schemeClr>
-                </a:solidFill>
-                <a:latin typeface="Ubuntu Mono" panose="020B0509030602030204" charset="0"/>
-                <a:ea typeface="FZHei-B01" panose="03000509000000000000" charset="-122"/>
-                <a:cs typeface="Ubuntu Mono" panose="020B0509030602030204" charset="0"/>
-              </a:rPr>
-              <a:t>trait</a:t>
-            </a:r>
-            <a:r>
-              <a:rPr lang="en-US" sz="1700">
-                <a:solidFill>
-                  <a:schemeClr val="tx1"/>
-                </a:solidFill>
-                <a:latin typeface="Helvetica Now Display" panose="020B0604030202020204" charset="0"/>
-                <a:ea typeface="FZHei-B01" panose="03000509000000000000" charset="-122"/>
-                <a:cs typeface="Helvetica Now Display" panose="020B0604030202020204" charset="0"/>
-                <a:sym typeface="+mn-ea"/>
-              </a:rPr>
-              <a:t> </a:t>
-            </a:r>
-            <a:r>
-              <a:rPr lang="en-US" sz="1700">
-                <a:solidFill>
-                  <a:schemeClr val="tx1"/>
-                </a:solidFill>
-                <a:latin typeface="Helvetica Now Display" panose="020B0604030202020204" charset="0"/>
-                <a:ea typeface="FZHei-B01" panose="03000509000000000000" charset="-122"/>
-                <a:cs typeface="Helvetica Now Display" panose="020B0604030202020204" charset="0"/>
-              </a:rPr>
-              <a:t>DataAPI</a:t>
-            </a:r>
-            <a:endParaRPr lang="en-US" sz="1700">
-              <a:solidFill>
-                <a:schemeClr val="tx1"/>
-              </a:solidFill>
-              <a:latin typeface="Helvetica Now Display" panose="020B0604030202020204" charset="0"/>
-              <a:ea typeface="FZHei-B01" panose="03000509000000000000" charset="-122"/>
-              <a:cs typeface="Helvetica Now Display" panose="020B0604030202020204" charset="0"/>
-            </a:endParaRPr>
-          </a:p>
-          <a:p>
-            <a:pPr algn="ctr"/>
-            <a:r>
-              <a:rPr lang="en-US" sz="1700">
-                <a:solidFill>
-                  <a:schemeClr val="bg1">
-                    <a:lumMod val="65000"/>
-                  </a:schemeClr>
-                </a:solidFill>
-                <a:latin typeface="Ubuntu Mono" panose="020B0509030602030204" charset="0"/>
-                <a:ea typeface="FZHei-B01" panose="03000509000000000000" charset="-122"/>
-                <a:cs typeface="Ubuntu Mono" panose="020B0509030602030204" charset="0"/>
-                <a:sym typeface="+mn-ea"/>
-              </a:rPr>
-              <a:t>trait</a:t>
-            </a:r>
-            <a:r>
-              <a:rPr lang="en-US" sz="1700">
-                <a:solidFill>
-                  <a:schemeClr val="tx1"/>
-                </a:solidFill>
-                <a:latin typeface="Helvetica Now Display" panose="020B0604030202020204" charset="0"/>
-                <a:ea typeface="FZHei-B01" panose="03000509000000000000" charset="-122"/>
-                <a:cs typeface="Helvetica Now Display" panose="020B0604030202020204" charset="0"/>
-                <a:sym typeface="+mn-ea"/>
-              </a:rPr>
-              <a:t> </a:t>
-            </a:r>
-            <a:r>
-              <a:rPr lang="en-US" sz="1700">
-                <a:solidFill>
-                  <a:schemeClr val="tx1"/>
-                </a:solidFill>
-                <a:latin typeface="Helvetica Now Display" panose="020B0604030202020204" charset="0"/>
-                <a:ea typeface="FZHei-B01" panose="03000509000000000000" charset="-122"/>
-                <a:cs typeface="Helvetica Now Display" panose="020B0604030202020204" charset="0"/>
-              </a:rPr>
-              <a:t>DataMutAPI</a:t>
-            </a:r>
-            <a:endParaRPr lang="en-US" sz="1700">
-              <a:solidFill>
-                <a:schemeClr val="tx1"/>
-              </a:solidFill>
-              <a:latin typeface="Helvetica Now Display" panose="020B0604030202020204" charset="0"/>
-              <a:ea typeface="FZHei-B01" panose="03000509000000000000" charset="-122"/>
-              <a:cs typeface="Helvetica Now Display" panose="020B0604030202020204" charset="0"/>
-            </a:endParaRPr>
-          </a:p>
-        </p:txBody>
-      </p:sp>
-      <p:sp>
-        <p:nvSpPr>
-          <p:cNvPr id="15" name="Rectangles 14"/>
-          <p:cNvSpPr/>
-          <p:nvPr/>
-        </p:nvSpPr>
-        <p:spPr>
-          <a:xfrm>
-            <a:off x="6224905" y="2950210"/>
-            <a:ext cx="2743200" cy="400685"/>
-          </a:xfrm>
-          <a:prstGeom prst="rect">
-            <a:avLst/>
-          </a:prstGeom>
-          <a:noFill/>
-          <a:ln w="19050">
-            <a:solidFill>
-              <a:schemeClr val="tx1"/>
-            </a:solidFill>
-          </a:ln>
-          <a:extLst>
-            <a:ext uri="{909E8E84-426E-40DD-AFC4-6F175D3DCCD1}">
-              <a14:hiddenFill xmlns:a14="http://schemas.microsoft.com/office/drawing/2010/main">
-                <a:solidFill>
-                  <a:schemeClr val="accent1"/>
-                </a:solidFill>
-              </a14:hiddenFill>
-            </a:ext>
-          </a:extLst>
-        </p:spPr>
-        <p:style>
-          <a:lnRef idx="2">
-            <a:schemeClr val="accent1">
-              <a:lumMod val="75000"/>
-            </a:schemeClr>
-          </a:lnRef>
-          <a:fillRef idx="1">
-            <a:schemeClr val="accent1"/>
-          </a:fillRef>
-          <a:effectRef idx="0">
-            <a:srgbClr val="FFFFFF"/>
-          </a:effectRef>
-          <a:fontRef idx="minor">
-            <a:schemeClr val="lt1"/>
-          </a:fontRef>
-        </p:style>
-        <p:txBody>
-          <a:bodyPr rtlCol="0" anchor="ctr"/>
-          <a:p>
-            <a:pPr algn="ctr"/>
-            <a:r>
-              <a:rPr lang="en-US" sz="1700">
-                <a:solidFill>
-                  <a:srgbClr val="FFA1A1"/>
-                </a:solidFill>
-                <a:latin typeface="Ubuntu Mono" panose="020B0509030602030204" charset="0"/>
-                <a:ea typeface="FZHei-B01" panose="03000509000000000000" charset="-122"/>
-                <a:cs typeface="Ubuntu Mono" panose="020B0509030602030204" charset="0"/>
-              </a:rPr>
-              <a:t>abbr</a:t>
-            </a:r>
-            <a:r>
-              <a:rPr lang="en-US" sz="1700">
-                <a:solidFill>
-                  <a:schemeClr val="tx1"/>
-                </a:solidFill>
-                <a:latin typeface="Helvetica Now Display" panose="020B0604030202020204" charset="0"/>
-                <a:ea typeface="FZHei-B01" panose="03000509000000000000" charset="-122"/>
-                <a:cs typeface="Helvetica Now Display" panose="020B0604030202020204" charset="0"/>
-                <a:sym typeface="+mn-ea"/>
-              </a:rPr>
-              <a:t> </a:t>
-            </a:r>
-            <a:r>
-              <a:rPr lang="en-US" sz="1700">
-                <a:solidFill>
-                  <a:srgbClr val="FF0000"/>
-                </a:solidFill>
-                <a:latin typeface="Helvetica Now Display" panose="020B0604030202020204" charset="0"/>
-                <a:ea typeface="FZHei-B01" panose="03000509000000000000" charset="-122"/>
-                <a:cs typeface="Helvetica Now Display" panose="020B0604030202020204" charset="0"/>
-              </a:rPr>
-              <a:t>S</a:t>
-            </a:r>
-            <a:r>
-              <a:rPr lang="en-US" sz="1700">
-                <a:solidFill>
-                  <a:schemeClr val="tx1"/>
-                </a:solidFill>
-                <a:latin typeface="Helvetica Now Display" panose="020B0604030202020204" charset="0"/>
-                <a:ea typeface="FZHei-B01" panose="03000509000000000000" charset="-122"/>
-                <a:cs typeface="Helvetica Now Display" panose="020B0604030202020204" charset="0"/>
-              </a:rPr>
-              <a:t> </a:t>
-            </a:r>
-            <a:r>
-              <a:rPr lang="en-US" sz="1700">
-                <a:solidFill>
-                  <a:srgbClr val="FFA1A1"/>
-                </a:solidFill>
-                <a:latin typeface="Helvetica Now Display" panose="020B0604030202020204" charset="0"/>
-                <a:ea typeface="FZHei-B01" panose="03000509000000000000" charset="-122"/>
-                <a:cs typeface="Helvetica Now Display" panose="020B0604030202020204" charset="0"/>
-              </a:rPr>
-              <a:t>(storage)</a:t>
-            </a:r>
-            <a:endParaRPr lang="en-US" sz="1700">
-              <a:solidFill>
-                <a:srgbClr val="FFA1A1"/>
-              </a:solidFill>
-              <a:latin typeface="Helvetica Now Display" panose="020B0604030202020204" charset="0"/>
-              <a:ea typeface="FZHei-B01" panose="03000509000000000000" charset="-122"/>
-              <a:cs typeface="Helvetica Now Display" panose="020B0604030202020204" charset="0"/>
-            </a:endParaRPr>
-          </a:p>
-        </p:txBody>
-      </p:sp>
-      <p:sp>
-        <p:nvSpPr>
-          <p:cNvPr id="16" name="Rectangles 15"/>
-          <p:cNvSpPr/>
-          <p:nvPr/>
-        </p:nvSpPr>
-        <p:spPr>
-          <a:xfrm>
-            <a:off x="6224905" y="3350895"/>
-            <a:ext cx="2743200" cy="400685"/>
-          </a:xfrm>
-          <a:prstGeom prst="rect">
-            <a:avLst/>
-          </a:prstGeom>
-          <a:noFill/>
-          <a:ln w="19050">
-            <a:solidFill>
-              <a:schemeClr val="tx1"/>
-            </a:solidFill>
-          </a:ln>
-          <a:extLst>
-            <a:ext uri="{909E8E84-426E-40DD-AFC4-6F175D3DCCD1}">
-              <a14:hiddenFill xmlns:a14="http://schemas.microsoft.com/office/drawing/2010/main">
-                <a:solidFill>
-                  <a:schemeClr val="accent1"/>
-                </a:solidFill>
-              </a14:hiddenFill>
-            </a:ext>
-          </a:extLst>
-        </p:spPr>
-        <p:style>
-          <a:lnRef idx="2">
-            <a:schemeClr val="accent1">
-              <a:lumMod val="75000"/>
-            </a:schemeClr>
-          </a:lnRef>
-          <a:fillRef idx="1">
-            <a:schemeClr val="accent1"/>
-          </a:fillRef>
-          <a:effectRef idx="0">
-            <a:srgbClr val="FFFFFF"/>
-          </a:effectRef>
-          <a:fontRef idx="minor">
-            <a:schemeClr val="lt1"/>
-          </a:fontRef>
-        </p:style>
-        <p:txBody>
-          <a:bodyPr rtlCol="0" anchor="ctr"/>
-          <a:p>
-            <a:pPr algn="ctr"/>
-            <a:r>
-              <a:rPr lang="en-US" sz="1700">
-                <a:solidFill>
-                  <a:schemeClr val="bg1">
-                    <a:lumMod val="65000"/>
-                  </a:schemeClr>
-                </a:solidFill>
-                <a:latin typeface="Ubuntu Mono" panose="020B0509030602030204" charset="0"/>
-                <a:ea typeface="FZHei-B01" panose="03000509000000000000" charset="-122"/>
-                <a:cs typeface="Ubuntu Mono" panose="020B0509030602030204" charset="0"/>
-              </a:rPr>
-              <a:t>struct</a:t>
-            </a:r>
-            <a:r>
-              <a:rPr lang="en-US" sz="1700">
-                <a:solidFill>
-                  <a:schemeClr val="tx1"/>
-                </a:solidFill>
-                <a:latin typeface="Helvetica Now Display" panose="020B0604030202020204" charset="0"/>
-                <a:ea typeface="FZHei-B01" panose="03000509000000000000" charset="-122"/>
-                <a:cs typeface="Helvetica Now Display" panose="020B0604030202020204" charset="0"/>
-                <a:sym typeface="+mn-ea"/>
-              </a:rPr>
-              <a:t> </a:t>
-            </a:r>
-            <a:r>
-              <a:rPr lang="en-US" sz="1700">
-                <a:solidFill>
-                  <a:schemeClr val="tx1"/>
-                </a:solidFill>
-                <a:latin typeface="Helvetica Now Display" panose="020B0604030202020204" charset="0"/>
-                <a:ea typeface="FZHei-B01" panose="03000509000000000000" charset="-122"/>
-                <a:cs typeface="Helvetica Now Display" panose="020B0604030202020204" charset="0"/>
-              </a:rPr>
-              <a:t>Storage&lt;T, B&gt;</a:t>
-            </a:r>
-            <a:endParaRPr lang="en-US" sz="1700">
-              <a:solidFill>
-                <a:schemeClr val="tx1"/>
-              </a:solidFill>
-              <a:latin typeface="Helvetica Now Display" panose="020B0604030202020204" charset="0"/>
-              <a:ea typeface="FZHei-B01" panose="03000509000000000000" charset="-122"/>
-              <a:cs typeface="Helvetica Now Display" panose="020B0604030202020204" charset="0"/>
-            </a:endParaRPr>
-          </a:p>
-        </p:txBody>
-      </p:sp>
-      <p:sp>
-        <p:nvSpPr>
-          <p:cNvPr id="17" name="Rectangles 16"/>
-          <p:cNvSpPr/>
-          <p:nvPr/>
-        </p:nvSpPr>
-        <p:spPr>
-          <a:xfrm>
-            <a:off x="6224905" y="3751580"/>
-            <a:ext cx="2743200" cy="400685"/>
-          </a:xfrm>
-          <a:prstGeom prst="rect">
-            <a:avLst/>
-          </a:prstGeom>
-          <a:noFill/>
-          <a:ln w="19050">
-            <a:solidFill>
-              <a:schemeClr val="tx1"/>
-            </a:solidFill>
-          </a:ln>
-          <a:extLst>
-            <a:ext uri="{909E8E84-426E-40DD-AFC4-6F175D3DCCD1}">
-              <a14:hiddenFill xmlns:a14="http://schemas.microsoft.com/office/drawing/2010/main">
-                <a:solidFill>
-                  <a:schemeClr val="accent1"/>
-                </a:solidFill>
-              </a14:hiddenFill>
-            </a:ext>
-          </a:extLst>
-        </p:spPr>
-        <p:style>
-          <a:lnRef idx="2">
-            <a:schemeClr val="accent1">
-              <a:lumMod val="75000"/>
-            </a:schemeClr>
-          </a:lnRef>
-          <a:fillRef idx="1">
-            <a:schemeClr val="accent1"/>
-          </a:fillRef>
-          <a:effectRef idx="0">
-            <a:srgbClr val="FFFFFF"/>
-          </a:effectRef>
-          <a:fontRef idx="minor">
-            <a:schemeClr val="lt1"/>
-          </a:fontRef>
-        </p:style>
-        <p:txBody>
-          <a:bodyPr rtlCol="0" anchor="ctr"/>
-          <a:p>
-            <a:pPr algn="ctr"/>
-            <a:r>
-              <a:rPr lang="en-US" sz="1700">
-                <a:solidFill>
-                  <a:schemeClr val="bg1">
-                    <a:lumMod val="65000"/>
-                  </a:schemeClr>
-                </a:solidFill>
-                <a:latin typeface="Ubuntu Mono" panose="020B0509030602030204" charset="0"/>
-                <a:ea typeface="FZHei-B01" panose="03000509000000000000" charset="-122"/>
-                <a:cs typeface="Ubuntu Mono" panose="020B0509030602030204" charset="0"/>
-              </a:rPr>
-              <a:t>trait</a:t>
-            </a:r>
-            <a:r>
-              <a:rPr lang="en-US" sz="1700">
-                <a:solidFill>
-                  <a:schemeClr val="tx1"/>
-                </a:solidFill>
-                <a:latin typeface="Helvetica Now Display" panose="020B0604030202020204" charset="0"/>
-                <a:ea typeface="FZHei-B01" panose="03000509000000000000" charset="-122"/>
-                <a:cs typeface="Helvetica Now Display" panose="020B0604030202020204" charset="0"/>
-                <a:sym typeface="+mn-ea"/>
-              </a:rPr>
-              <a:t> </a:t>
-            </a:r>
-            <a:r>
-              <a:rPr lang="en-US" sz="1700">
-                <a:solidFill>
-                  <a:schemeClr val="tx1"/>
-                </a:solidFill>
-                <a:latin typeface="Helvetica Now Display" panose="020B0604030202020204" charset="0"/>
-                <a:ea typeface="FZHei-B01" panose="03000509000000000000" charset="-122"/>
-                <a:cs typeface="Helvetica Now Display" panose="020B0604030202020204" charset="0"/>
-              </a:rPr>
-              <a:t>StorageAPI</a:t>
-            </a:r>
-            <a:endParaRPr lang="en-US" sz="1700">
-              <a:solidFill>
-                <a:schemeClr val="tx1"/>
-              </a:solidFill>
-              <a:latin typeface="Helvetica Now Display" panose="020B0604030202020204" charset="0"/>
-              <a:ea typeface="FZHei-B01" panose="03000509000000000000" charset="-122"/>
-              <a:cs typeface="Helvetica Now Display" panose="020B0604030202020204" charset="0"/>
-            </a:endParaRPr>
-          </a:p>
-        </p:txBody>
-      </p:sp>
-      <p:sp>
-        <p:nvSpPr>
-          <p:cNvPr id="18" name="Rectangles 17"/>
-          <p:cNvSpPr/>
-          <p:nvPr/>
-        </p:nvSpPr>
-        <p:spPr>
-          <a:xfrm>
-            <a:off x="6224905" y="4653280"/>
-            <a:ext cx="2743200" cy="400685"/>
-          </a:xfrm>
-          <a:prstGeom prst="rect">
-            <a:avLst/>
-          </a:prstGeom>
-          <a:noFill/>
-          <a:ln w="19050">
-            <a:solidFill>
-              <a:schemeClr val="tx1"/>
-            </a:solidFill>
-          </a:ln>
-          <a:extLst>
-            <a:ext uri="{909E8E84-426E-40DD-AFC4-6F175D3DCCD1}">
-              <a14:hiddenFill xmlns:a14="http://schemas.microsoft.com/office/drawing/2010/main">
-                <a:solidFill>
-                  <a:schemeClr val="accent1"/>
-                </a:solidFill>
-              </a14:hiddenFill>
-            </a:ext>
-          </a:extLst>
-        </p:spPr>
-        <p:style>
-          <a:lnRef idx="2">
-            <a:schemeClr val="accent1">
-              <a:lumMod val="75000"/>
-            </a:schemeClr>
-          </a:lnRef>
-          <a:fillRef idx="1">
-            <a:schemeClr val="accent1"/>
-          </a:fillRef>
-          <a:effectRef idx="0">
-            <a:srgbClr val="FFFFFF"/>
-          </a:effectRef>
-          <a:fontRef idx="minor">
-            <a:schemeClr val="lt1"/>
-          </a:fontRef>
-        </p:style>
-        <p:txBody>
-          <a:bodyPr rtlCol="0" anchor="ctr"/>
-          <a:p>
-            <a:pPr algn="ctr"/>
-            <a:r>
-              <a:rPr lang="en-US" sz="1700">
-                <a:solidFill>
-                  <a:srgbClr val="FFA1A1"/>
-                </a:solidFill>
-                <a:latin typeface="Ubuntu Mono" panose="020B0509030602030204" charset="0"/>
-                <a:ea typeface="FZHei-B01" panose="03000509000000000000" charset="-122"/>
-                <a:cs typeface="Ubuntu Mono" panose="020B0509030602030204" charset="0"/>
-              </a:rPr>
-              <a:t>abbr</a:t>
-            </a:r>
-            <a:r>
-              <a:rPr lang="en-US" sz="1700">
-                <a:solidFill>
-                  <a:schemeClr val="tx1"/>
-                </a:solidFill>
-                <a:latin typeface="Helvetica Now Display" panose="020B0604030202020204" charset="0"/>
-                <a:ea typeface="FZHei-B01" panose="03000509000000000000" charset="-122"/>
-                <a:cs typeface="Helvetica Now Display" panose="020B0604030202020204" charset="0"/>
-                <a:sym typeface="+mn-ea"/>
-              </a:rPr>
-              <a:t> </a:t>
-            </a:r>
-            <a:r>
-              <a:rPr lang="en-US" sz="1700">
-                <a:solidFill>
-                  <a:srgbClr val="FF0000"/>
-                </a:solidFill>
-                <a:latin typeface="Helvetica Now Display" panose="020B0604030202020204" charset="0"/>
-                <a:ea typeface="FZHei-B01" panose="03000509000000000000" charset="-122"/>
-                <a:cs typeface="Helvetica Now Display" panose="020B0604030202020204" charset="0"/>
-                <a:sym typeface="+mn-ea"/>
-              </a:rPr>
-              <a:t>B</a:t>
-            </a:r>
-            <a:r>
-              <a:rPr lang="en-US" sz="1700">
-                <a:solidFill>
-                  <a:schemeClr val="tx1"/>
-                </a:solidFill>
-                <a:latin typeface="Helvetica Now Display" panose="020B0604030202020204" charset="0"/>
-                <a:ea typeface="FZHei-B01" panose="03000509000000000000" charset="-122"/>
-                <a:cs typeface="Helvetica Now Display" panose="020B0604030202020204" charset="0"/>
-              </a:rPr>
-              <a:t> </a:t>
-            </a:r>
-            <a:r>
-              <a:rPr lang="en-US" sz="1700">
-                <a:solidFill>
-                  <a:srgbClr val="FFA1A1"/>
-                </a:solidFill>
-                <a:latin typeface="Helvetica Now Display" panose="020B0604030202020204" charset="0"/>
-                <a:ea typeface="FZHei-B01" panose="03000509000000000000" charset="-122"/>
-                <a:cs typeface="Helvetica Now Display" panose="020B0604030202020204" charset="0"/>
-              </a:rPr>
-              <a:t>(backend)</a:t>
-            </a:r>
-            <a:endParaRPr lang="en-US" sz="1700">
-              <a:solidFill>
-                <a:srgbClr val="FFA1A1"/>
-              </a:solidFill>
-              <a:latin typeface="Helvetica Now Display" panose="020B0604030202020204" charset="0"/>
-              <a:ea typeface="FZHei-B01" panose="03000509000000000000" charset="-122"/>
-              <a:cs typeface="Helvetica Now Display" panose="020B0604030202020204" charset="0"/>
-            </a:endParaRPr>
-          </a:p>
-        </p:txBody>
-      </p:sp>
       <p:cxnSp>
         <p:nvCxnSpPr>
-          <p:cNvPr id="19" name="Straight Arrow Connector 18"/>
+          <p:cNvPr id="41" name="Straight Arrow Connector 40"/>
           <p:cNvCxnSpPr/>
           <p:nvPr/>
         </p:nvCxnSpPr>
         <p:spPr>
           <a:xfrm>
-            <a:off x="7596505" y="4152265"/>
-            <a:ext cx="0" cy="501015"/>
-          </a:xfrm>
-          <a:prstGeom prst="straightConnector1">
-            <a:avLst/>
-          </a:prstGeom>
-          <a:ln w="19050">
-            <a:solidFill>
-              <a:schemeClr val="tx1"/>
-            </a:solidFill>
-            <a:round/>
-            <a:tailEnd type="triangle" w="med" len="lg"/>
-          </a:ln>
-        </p:spPr>
-        <p:style>
-          <a:lnRef idx="2">
-            <a:schemeClr val="accent1"/>
-          </a:lnRef>
-          <a:fillRef idx="0">
-            <a:srgbClr val="FFFFFF"/>
-          </a:fillRef>
-          <a:effectRef idx="0">
-            <a:srgbClr val="FFFFFF"/>
-          </a:effectRef>
-          <a:fontRef idx="minor">
-            <a:schemeClr val="tx1"/>
-          </a:fontRef>
-        </p:style>
-      </p:cxnSp>
-      <p:sp>
-        <p:nvSpPr>
-          <p:cNvPr id="20" name="Rectangles 19"/>
-          <p:cNvSpPr/>
-          <p:nvPr/>
-        </p:nvSpPr>
-        <p:spPr>
-          <a:xfrm>
-            <a:off x="9194165" y="3851910"/>
-            <a:ext cx="2743200" cy="400685"/>
-          </a:xfrm>
-          <a:prstGeom prst="rect">
-            <a:avLst/>
-          </a:prstGeom>
-          <a:noFill/>
-          <a:ln w="19050">
-            <a:solidFill>
-              <a:schemeClr val="tx1"/>
-            </a:solidFill>
-          </a:ln>
-          <a:extLst>
-            <a:ext uri="{909E8E84-426E-40DD-AFC4-6F175D3DCCD1}">
-              <a14:hiddenFill xmlns:a14="http://schemas.microsoft.com/office/drawing/2010/main">
-                <a:solidFill>
-                  <a:schemeClr val="accent1"/>
-                </a:solidFill>
-              </a14:hiddenFill>
-            </a:ext>
-          </a:extLst>
-        </p:spPr>
-        <p:style>
-          <a:lnRef idx="2">
-            <a:schemeClr val="accent1">
-              <a:lumMod val="75000"/>
-            </a:schemeClr>
-          </a:lnRef>
-          <a:fillRef idx="1">
-            <a:schemeClr val="accent1"/>
-          </a:fillRef>
-          <a:effectRef idx="0">
-            <a:srgbClr val="FFFFFF"/>
-          </a:effectRef>
-          <a:fontRef idx="minor">
-            <a:schemeClr val="lt1"/>
-          </a:fontRef>
-        </p:style>
-        <p:txBody>
-          <a:bodyPr rtlCol="0" anchor="ctr"/>
-          <a:p>
-            <a:pPr algn="ctr"/>
-            <a:r>
-              <a:rPr lang="en-US" sz="1700">
-                <a:solidFill>
-                  <a:srgbClr val="FFA1A1"/>
-                </a:solidFill>
-                <a:latin typeface="Ubuntu Mono" panose="020B0509030602030204" charset="0"/>
-                <a:ea typeface="FZHei-B01" panose="03000509000000000000" charset="-122"/>
-                <a:cs typeface="Ubuntu Mono" panose="020B0509030602030204" charset="0"/>
-              </a:rPr>
-              <a:t>abbr</a:t>
-            </a:r>
-            <a:r>
-              <a:rPr lang="en-US" sz="1700">
-                <a:solidFill>
-                  <a:schemeClr val="tx1"/>
-                </a:solidFill>
-                <a:latin typeface="Helvetica Now Display" panose="020B0604030202020204" charset="0"/>
-                <a:ea typeface="FZHei-B01" panose="03000509000000000000" charset="-122"/>
-                <a:cs typeface="Helvetica Now Display" panose="020B0604030202020204" charset="0"/>
-                <a:sym typeface="+mn-ea"/>
-              </a:rPr>
-              <a:t> </a:t>
-            </a:r>
-            <a:r>
-              <a:rPr lang="en-US" sz="1700">
-                <a:solidFill>
-                  <a:srgbClr val="FF0000"/>
-                </a:solidFill>
-                <a:latin typeface="Helvetica Now Display" panose="020B0604030202020204" charset="0"/>
-                <a:ea typeface="FZHei-B01" panose="03000509000000000000" charset="-122"/>
-                <a:cs typeface="Helvetica Now Display" panose="020B0604030202020204" charset="0"/>
-              </a:rPr>
-              <a:t>T</a:t>
-            </a:r>
-            <a:r>
-              <a:rPr lang="en-US" sz="1700">
-                <a:solidFill>
-                  <a:schemeClr val="tx1"/>
-                </a:solidFill>
-                <a:latin typeface="Helvetica Now Display" panose="020B0604030202020204" charset="0"/>
-                <a:ea typeface="FZHei-B01" panose="03000509000000000000" charset="-122"/>
-                <a:cs typeface="Helvetica Now Display" panose="020B0604030202020204" charset="0"/>
-              </a:rPr>
-              <a:t> </a:t>
-            </a:r>
-            <a:r>
-              <a:rPr lang="en-US" sz="1700">
-                <a:solidFill>
-                  <a:srgbClr val="FFA1A1"/>
-                </a:solidFill>
-                <a:latin typeface="Helvetica Now Display" panose="020B0604030202020204" charset="0"/>
-                <a:ea typeface="FZHei-B01" panose="03000509000000000000" charset="-122"/>
-                <a:cs typeface="Helvetica Now Display" panose="020B0604030202020204" charset="0"/>
-              </a:rPr>
-              <a:t>(data type)</a:t>
-            </a:r>
-            <a:endParaRPr lang="en-US" sz="1700">
-              <a:solidFill>
-                <a:srgbClr val="FFA1A1"/>
-              </a:solidFill>
-              <a:latin typeface="Helvetica Now Display" panose="020B0604030202020204" charset="0"/>
-              <a:ea typeface="FZHei-B01" panose="03000509000000000000" charset="-122"/>
-              <a:cs typeface="Helvetica Now Display" panose="020B0604030202020204" charset="0"/>
-            </a:endParaRPr>
-          </a:p>
-        </p:txBody>
-      </p:sp>
-      <p:sp>
-        <p:nvSpPr>
-          <p:cNvPr id="24" name="Rectangles 23"/>
-          <p:cNvSpPr/>
-          <p:nvPr/>
-        </p:nvSpPr>
-        <p:spPr>
-          <a:xfrm>
-            <a:off x="9194165" y="4252595"/>
-            <a:ext cx="2743200" cy="400685"/>
-          </a:xfrm>
-          <a:prstGeom prst="rect">
-            <a:avLst/>
-          </a:prstGeom>
-          <a:noFill/>
-          <a:ln w="19050">
-            <a:solidFill>
-              <a:schemeClr val="tx1"/>
-            </a:solidFill>
-          </a:ln>
-          <a:extLst>
-            <a:ext uri="{909E8E84-426E-40DD-AFC4-6F175D3DCCD1}">
-              <a14:hiddenFill xmlns:a14="http://schemas.microsoft.com/office/drawing/2010/main">
-                <a:solidFill>
-                  <a:schemeClr val="accent1"/>
-                </a:solidFill>
-              </a14:hiddenFill>
-            </a:ext>
-          </a:extLst>
-        </p:spPr>
-        <p:style>
-          <a:lnRef idx="2">
-            <a:schemeClr val="accent1">
-              <a:lumMod val="75000"/>
-            </a:schemeClr>
-          </a:lnRef>
-          <a:fillRef idx="1">
-            <a:schemeClr val="accent1"/>
-          </a:fillRef>
-          <a:effectRef idx="0">
-            <a:srgbClr val="FFFFFF"/>
-          </a:effectRef>
-          <a:fontRef idx="minor">
-            <a:schemeClr val="lt1"/>
-          </a:fontRef>
-        </p:style>
-        <p:txBody>
-          <a:bodyPr rtlCol="0" anchor="ctr"/>
-          <a:p>
-            <a:pPr algn="ctr"/>
-            <a:r>
-              <a:rPr lang="en-US" sz="1700">
-                <a:solidFill>
-                  <a:schemeClr val="bg1">
-                    <a:lumMod val="65000"/>
-                  </a:schemeClr>
-                </a:solidFill>
-                <a:latin typeface="Ubuntu Mono" panose="020B0509030602030204" charset="0"/>
-                <a:ea typeface="FZHei-B01" panose="03000509000000000000" charset="-122"/>
-                <a:cs typeface="Ubuntu Mono" panose="020B0509030602030204" charset="0"/>
-              </a:rPr>
-              <a:t>type</a:t>
-            </a:r>
-            <a:r>
-              <a:rPr lang="en-US" sz="1700">
-                <a:solidFill>
-                  <a:schemeClr val="tx1"/>
-                </a:solidFill>
-                <a:latin typeface="Helvetica Now Display" panose="020B0604030202020204" charset="0"/>
-                <a:ea typeface="FZHei-B01" panose="03000509000000000000" charset="-122"/>
-                <a:cs typeface="Helvetica Now Display" panose="020B0604030202020204" charset="0"/>
-                <a:sym typeface="+mn-ea"/>
-              </a:rPr>
-              <a:t> </a:t>
-            </a:r>
-            <a:r>
-              <a:rPr lang="en-US" sz="1700">
-                <a:solidFill>
-                  <a:schemeClr val="tx1"/>
-                </a:solidFill>
-                <a:latin typeface="Helvetica Now Display" panose="020B0604030202020204" charset="0"/>
-                <a:ea typeface="FZHei-B01" panose="03000509000000000000" charset="-122"/>
-                <a:cs typeface="Helvetica Now Display" panose="020B0604030202020204" charset="0"/>
-              </a:rPr>
-              <a:t>RawVec ~ Vec&lt;T&gt;</a:t>
-            </a:r>
-            <a:endParaRPr lang="en-US" sz="1700">
-              <a:solidFill>
-                <a:schemeClr val="tx1"/>
-              </a:solidFill>
-              <a:latin typeface="Helvetica Now Display" panose="020B0604030202020204" charset="0"/>
-              <a:ea typeface="FZHei-B01" panose="03000509000000000000" charset="-122"/>
-              <a:cs typeface="Helvetica Now Display" panose="020B0604030202020204" charset="0"/>
-            </a:endParaRPr>
-          </a:p>
-        </p:txBody>
-      </p:sp>
-      <p:cxnSp>
-        <p:nvCxnSpPr>
-          <p:cNvPr id="25" name="Straight Arrow Connector 24"/>
-          <p:cNvCxnSpPr/>
-          <p:nvPr/>
-        </p:nvCxnSpPr>
-        <p:spPr>
-          <a:xfrm>
-            <a:off x="4627245" y="3538220"/>
-            <a:ext cx="0" cy="501015"/>
-          </a:xfrm>
-          <a:prstGeom prst="straightConnector1">
-            <a:avLst/>
-          </a:prstGeom>
-          <a:ln w="19050">
-            <a:solidFill>
-              <a:schemeClr val="tx1"/>
-            </a:solidFill>
-            <a:round/>
-            <a:tailEnd type="triangle" w="med" len="lg"/>
-          </a:ln>
-        </p:spPr>
-        <p:style>
-          <a:lnRef idx="2">
-            <a:schemeClr val="accent1"/>
-          </a:lnRef>
-          <a:fillRef idx="0">
-            <a:srgbClr val="FFFFFF"/>
-          </a:fillRef>
-          <a:effectRef idx="0">
-            <a:srgbClr val="FFFFFF"/>
-          </a:effectRef>
-          <a:fontRef idx="minor">
-            <a:schemeClr val="tx1"/>
-          </a:fontRef>
-        </p:style>
-      </p:cxnSp>
-      <p:sp>
-        <p:nvSpPr>
-          <p:cNvPr id="26" name="Rectangles 25"/>
-          <p:cNvSpPr/>
-          <p:nvPr/>
-        </p:nvSpPr>
-        <p:spPr>
-          <a:xfrm>
-            <a:off x="3255645" y="4039235"/>
-            <a:ext cx="2743200" cy="400685"/>
-          </a:xfrm>
-          <a:prstGeom prst="rect">
-            <a:avLst/>
-          </a:prstGeom>
-          <a:noFill/>
-          <a:ln w="19050">
-            <a:solidFill>
-              <a:schemeClr val="tx1"/>
-            </a:solidFill>
-          </a:ln>
-          <a:extLst>
-            <a:ext uri="{909E8E84-426E-40DD-AFC4-6F175D3DCCD1}">
-              <a14:hiddenFill xmlns:a14="http://schemas.microsoft.com/office/drawing/2010/main">
-                <a:solidFill>
-                  <a:schemeClr val="accent1"/>
-                </a:solidFill>
-              </a14:hiddenFill>
-            </a:ext>
-          </a:extLst>
-        </p:spPr>
-        <p:style>
-          <a:lnRef idx="2">
-            <a:schemeClr val="accent1">
-              <a:lumMod val="75000"/>
-            </a:schemeClr>
-          </a:lnRef>
-          <a:fillRef idx="1">
-            <a:schemeClr val="accent1"/>
-          </a:fillRef>
-          <a:effectRef idx="0">
-            <a:srgbClr val="FFFFFF"/>
-          </a:effectRef>
-          <a:fontRef idx="minor">
-            <a:schemeClr val="lt1"/>
-          </a:fontRef>
-        </p:style>
-        <p:txBody>
-          <a:bodyPr rtlCol="0" anchor="ctr"/>
-          <a:p>
-            <a:pPr algn="ctr"/>
-            <a:r>
-              <a:rPr lang="en-US" sz="1700">
-                <a:solidFill>
-                  <a:srgbClr val="FFA1A1"/>
-                </a:solidFill>
-                <a:latin typeface="Ubuntu Mono" panose="020B0509030602030204" charset="0"/>
-                <a:ea typeface="FZHei-B01" panose="03000509000000000000" charset="-122"/>
-                <a:cs typeface="Ubuntu Mono" panose="020B0509030602030204" charset="0"/>
-              </a:rPr>
-              <a:t>lifetime</a:t>
-            </a:r>
-            <a:r>
-              <a:rPr lang="en-US" sz="1700">
-                <a:solidFill>
-                  <a:schemeClr val="tx1"/>
-                </a:solidFill>
-                <a:latin typeface="Helvetica Now Display" panose="020B0604030202020204" charset="0"/>
-                <a:ea typeface="FZHei-B01" panose="03000509000000000000" charset="-122"/>
-                <a:cs typeface="Helvetica Now Display" panose="020B0604030202020204" charset="0"/>
-                <a:sym typeface="+mn-ea"/>
-              </a:rPr>
-              <a:t> </a:t>
-            </a:r>
-            <a:r>
-              <a:rPr lang="en-US" sz="1700">
-                <a:solidFill>
-                  <a:srgbClr val="FF0000"/>
-                </a:solidFill>
-                <a:latin typeface="Helvetica Now Display" panose="020B0604030202020204" charset="0"/>
-                <a:ea typeface="FZHei-B01" panose="03000509000000000000" charset="-122"/>
-                <a:cs typeface="Helvetica Now Display" panose="020B0604030202020204" charset="0"/>
-              </a:rPr>
-              <a:t>'l</a:t>
-            </a:r>
-            <a:endParaRPr lang="en-US" sz="1700">
-              <a:solidFill>
-                <a:srgbClr val="FF0000"/>
-              </a:solidFill>
-              <a:latin typeface="Helvetica Now Display" panose="020B0604030202020204" charset="0"/>
-              <a:ea typeface="FZHei-B01" panose="03000509000000000000" charset="-122"/>
-              <a:cs typeface="Helvetica Now Display" panose="020B0604030202020204" charset="0"/>
-            </a:endParaRPr>
-          </a:p>
-        </p:txBody>
-      </p:sp>
-      <p:sp>
-        <p:nvSpPr>
-          <p:cNvPr id="27" name="Rectangles 26"/>
-          <p:cNvSpPr/>
-          <p:nvPr/>
-        </p:nvSpPr>
-        <p:spPr>
-          <a:xfrm>
-            <a:off x="3255645" y="4439920"/>
-            <a:ext cx="2743200" cy="688340"/>
-          </a:xfrm>
-          <a:prstGeom prst="rect">
-            <a:avLst/>
-          </a:prstGeom>
-          <a:noFill/>
-          <a:ln w="19050">
-            <a:solidFill>
-              <a:schemeClr val="tx1"/>
-            </a:solidFill>
-          </a:ln>
-          <a:extLst>
-            <a:ext uri="{909E8E84-426E-40DD-AFC4-6F175D3DCCD1}">
-              <a14:hiddenFill xmlns:a14="http://schemas.microsoft.com/office/drawing/2010/main">
-                <a:solidFill>
-                  <a:schemeClr val="accent1"/>
-                </a:solidFill>
-              </a14:hiddenFill>
-            </a:ext>
-          </a:extLst>
-        </p:spPr>
-        <p:style>
-          <a:lnRef idx="2">
-            <a:schemeClr val="accent1">
-              <a:lumMod val="75000"/>
-            </a:schemeClr>
-          </a:lnRef>
-          <a:fillRef idx="1">
-            <a:schemeClr val="accent1"/>
-          </a:fillRef>
-          <a:effectRef idx="0">
-            <a:srgbClr val="FFFFFF"/>
-          </a:effectRef>
-          <a:fontRef idx="minor">
-            <a:schemeClr val="lt1"/>
-          </a:fontRef>
-        </p:style>
-        <p:txBody>
-          <a:bodyPr rtlCol="0" anchor="ctr"/>
-          <a:p>
-            <a:pPr algn="ctr"/>
-            <a:r>
-              <a:rPr lang="en-US" sz="1700">
-                <a:solidFill>
-                  <a:schemeClr val="bg1">
-                    <a:lumMod val="65000"/>
-                  </a:schemeClr>
-                </a:solidFill>
-                <a:latin typeface="Ubuntu Mono" panose="020B0509030602030204" charset="0"/>
-                <a:ea typeface="FZHei-B01" panose="03000509000000000000" charset="-122"/>
-                <a:cs typeface="Ubuntu Mono" panose="020B0509030602030204" charset="0"/>
-              </a:rPr>
-              <a:t>ownership</a:t>
-            </a:r>
-            <a:endParaRPr lang="en-US" sz="1700">
-              <a:solidFill>
-                <a:schemeClr val="bg1">
-                  <a:lumMod val="65000"/>
-                </a:schemeClr>
-              </a:solidFill>
-              <a:latin typeface="Ubuntu Mono" panose="020B0509030602030204" charset="0"/>
-              <a:ea typeface="FZHei-B01" panose="03000509000000000000" charset="-122"/>
-              <a:cs typeface="Ubuntu Mono" panose="020B0509030602030204" charset="0"/>
-            </a:endParaRPr>
-          </a:p>
-          <a:p>
-            <a:pPr algn="ctr"/>
-            <a:r>
-              <a:rPr lang="en-US" sz="1700">
-                <a:solidFill>
-                  <a:schemeClr val="tx1"/>
-                </a:solidFill>
-                <a:latin typeface="Helvetica Now Display" panose="020B0604030202020204" charset="0"/>
-                <a:ea typeface="FZHei-B01" panose="03000509000000000000" charset="-122"/>
-                <a:cs typeface="Helvetica Now Display" panose="020B0604030202020204" charset="0"/>
-              </a:rPr>
-              <a:t>owned, ref, mut, cow, arc</a:t>
-            </a:r>
-            <a:endParaRPr lang="en-US" sz="1700">
-              <a:solidFill>
-                <a:schemeClr val="tx1"/>
-              </a:solidFill>
-              <a:latin typeface="Helvetica Now Display" panose="020B0604030202020204" charset="0"/>
-              <a:ea typeface="FZHei-B01" panose="03000509000000000000" charset="-122"/>
-              <a:cs typeface="Helvetica Now Display" panose="020B0604030202020204" charset="0"/>
-            </a:endParaRPr>
-          </a:p>
-        </p:txBody>
-      </p:sp>
-      <p:cxnSp>
-        <p:nvCxnSpPr>
-          <p:cNvPr id="28" name="Straight Arrow Connector 27"/>
-          <p:cNvCxnSpPr/>
-          <p:nvPr/>
-        </p:nvCxnSpPr>
-        <p:spPr>
-          <a:xfrm>
-            <a:off x="3029585" y="1347470"/>
-            <a:ext cx="1597660" cy="701040"/>
+            <a:off x="7338060" y="1739265"/>
+            <a:ext cx="1682115" cy="507365"/>
           </a:xfrm>
           <a:prstGeom prst="straightConnector1">
             <a:avLst/>
@@ -5435,14 +5519,198 @@
       </p:cxnSp>
       <p:cxnSp>
         <p:nvCxnSpPr>
-          <p:cNvPr id="29" name="Straight Arrow Connector 28"/>
+          <p:cNvPr id="42" name="Straight Arrow Connector 41"/>
           <p:cNvCxnSpPr/>
           <p:nvPr/>
         </p:nvCxnSpPr>
         <p:spPr>
           <a:xfrm>
-            <a:off x="5998845" y="2249170"/>
-            <a:ext cx="1597660" cy="701040"/>
+            <a:off x="9021445" y="3044825"/>
+            <a:ext cx="0" cy="320040"/>
+          </a:xfrm>
+          <a:prstGeom prst="straightConnector1">
+            <a:avLst/>
+          </a:prstGeom>
+          <a:ln w="19050">
+            <a:solidFill>
+              <a:schemeClr val="tx1"/>
+            </a:solidFill>
+            <a:round/>
+            <a:tailEnd type="triangle" w="med" len="lg"/>
+          </a:ln>
+        </p:spPr>
+        <p:style>
+          <a:lnRef idx="2">
+            <a:schemeClr val="accent1"/>
+          </a:lnRef>
+          <a:fillRef idx="0">
+            <a:srgbClr val="FFFFFF"/>
+          </a:fillRef>
+          <a:effectRef idx="0">
+            <a:srgbClr val="FFFFFF"/>
+          </a:effectRef>
+          <a:fontRef idx="minor">
+            <a:schemeClr val="tx1"/>
+          </a:fontRef>
+        </p:style>
+      </p:cxnSp>
+      <p:sp>
+        <p:nvSpPr>
+          <p:cNvPr id="44" name="Rectangles 43"/>
+          <p:cNvSpPr/>
+          <p:nvPr/>
+        </p:nvSpPr>
+        <p:spPr>
+          <a:xfrm>
+            <a:off x="7557135" y="4082415"/>
+            <a:ext cx="2926080" cy="656590"/>
+          </a:xfrm>
+          <a:prstGeom prst="rect">
+            <a:avLst/>
+          </a:prstGeom>
+          <a:noFill/>
+          <a:ln w="19050">
+            <a:solidFill>
+              <a:schemeClr val="tx1"/>
+            </a:solidFill>
+          </a:ln>
+          <a:extLst>
+            <a:ext uri="{909E8E84-426E-40DD-AFC4-6F175D3DCCD1}">
+              <a14:hiddenFill xmlns:a14="http://schemas.microsoft.com/office/drawing/2010/main">
+                <a:solidFill>
+                  <a:schemeClr val="accent1"/>
+                </a:solidFill>
+              </a14:hiddenFill>
+            </a:ext>
+          </a:extLst>
+        </p:spPr>
+        <p:style>
+          <a:lnRef idx="2">
+            <a:schemeClr val="accent1">
+              <a:lumMod val="75000"/>
+            </a:schemeClr>
+          </a:lnRef>
+          <a:fillRef idx="1">
+            <a:schemeClr val="accent1"/>
+          </a:fillRef>
+          <a:effectRef idx="0">
+            <a:srgbClr val="FFFFFF"/>
+          </a:effectRef>
+          <a:fontRef idx="minor">
+            <a:schemeClr val="lt1"/>
+          </a:fontRef>
+        </p:style>
+        <p:txBody>
+          <a:bodyPr rtlCol="0" anchor="ctr"/>
+          <a:p>
+            <a:pPr indent="0" algn="ctr" fontAlgn="auto">
+              <a:lnSpc>
+                <a:spcPct val="110000"/>
+              </a:lnSpc>
+            </a:pPr>
+            <a:r>
+              <a:rPr lang="en-US" sz="1600">
+                <a:solidFill>
+                  <a:srgbClr val="FFA1A1"/>
+                </a:solidFill>
+                <a:latin typeface="Ubuntu Mono" panose="020B0509030602030204" charset="0"/>
+                <a:ea typeface="FZHei-B01" panose="03000509000000000000" charset="-122"/>
+                <a:cs typeface="Ubuntu Mono" panose="020B0509030602030204" charset="0"/>
+              </a:rPr>
+              <a:t>abbr</a:t>
+            </a:r>
+            <a:r>
+              <a:rPr lang="en-US" sz="1600">
+                <a:solidFill>
+                  <a:schemeClr val="tx1"/>
+                </a:solidFill>
+                <a:latin typeface="Helvetica Now Display" panose="020B0604030202020204" charset="0"/>
+                <a:ea typeface="FZHei-B01" panose="03000509000000000000" charset="-122"/>
+                <a:cs typeface="Helvetica Now Display" panose="020B0604030202020204" charset="0"/>
+                <a:sym typeface="+mn-ea"/>
+              </a:rPr>
+              <a:t> </a:t>
+            </a:r>
+            <a:r>
+              <a:rPr lang="en-US" sz="1600">
+                <a:solidFill>
+                  <a:srgbClr val="FF0000"/>
+                </a:solidFill>
+                <a:latin typeface="Helvetica Now Display" panose="020B0604030202020204" charset="0"/>
+                <a:ea typeface="FZHei-B01" panose="03000509000000000000" charset="-122"/>
+                <a:cs typeface="Helvetica Now Display" panose="020B0604030202020204" charset="0"/>
+              </a:rPr>
+              <a:t>C</a:t>
+            </a:r>
+            <a:r>
+              <a:rPr lang="en-US" sz="1600">
+                <a:solidFill>
+                  <a:schemeClr val="tx1"/>
+                </a:solidFill>
+                <a:latin typeface="Helvetica Now Display" panose="020B0604030202020204" charset="0"/>
+                <a:ea typeface="FZHei-B01" panose="03000509000000000000" charset="-122"/>
+                <a:cs typeface="Helvetica Now Display" panose="020B0604030202020204" charset="0"/>
+              </a:rPr>
+              <a:t> </a:t>
+            </a:r>
+            <a:r>
+              <a:rPr lang="en-US" sz="1600">
+                <a:solidFill>
+                  <a:srgbClr val="FFA1A1"/>
+                </a:solidFill>
+                <a:latin typeface="Helvetica Now Display" panose="020B0604030202020204" charset="0"/>
+                <a:ea typeface="FZHei-B01" panose="03000509000000000000" charset="-122"/>
+                <a:cs typeface="Helvetica Now Display" panose="020B0604030202020204" charset="0"/>
+              </a:rPr>
+              <a:t>(Content/Raw)</a:t>
+            </a:r>
+            <a:endParaRPr lang="en-US" sz="1600">
+              <a:solidFill>
+                <a:srgbClr val="FFA1A1"/>
+              </a:solidFill>
+              <a:latin typeface="Helvetica Now Display" panose="020B0604030202020204" charset="0"/>
+              <a:ea typeface="FZHei-B01" panose="03000509000000000000" charset="-122"/>
+              <a:cs typeface="Helvetica Now Display" panose="020B0604030202020204" charset="0"/>
+            </a:endParaRPr>
+          </a:p>
+          <a:p>
+            <a:pPr indent="0" algn="ctr" fontAlgn="auto">
+              <a:lnSpc>
+                <a:spcPct val="110000"/>
+              </a:lnSpc>
+            </a:pPr>
+            <a:r>
+              <a:rPr lang="en-US" sz="1200">
+                <a:solidFill>
+                  <a:schemeClr val="tx1"/>
+                </a:solidFill>
+                <a:latin typeface="Ubuntu Mono" panose="020B0509030602030204" charset="0"/>
+                <a:ea typeface="FZHei-B01" panose="03000509000000000000" charset="-122"/>
+                <a:cs typeface="Ubuntu Mono" panose="020B0509030602030204" charset="0"/>
+              </a:rPr>
+              <a:t>for CPU: Vec&lt;T&gt;</a:t>
+            </a:r>
+            <a:endParaRPr lang="en-US" sz="1200">
+              <a:solidFill>
+                <a:schemeClr val="tx1"/>
+              </a:solidFill>
+              <a:latin typeface="Ubuntu Mono" panose="020B0509030602030204" charset="0"/>
+              <a:ea typeface="FZHei-B01" panose="03000509000000000000" charset="-122"/>
+              <a:cs typeface="Ubuntu Mono" panose="020B0509030602030204" charset="0"/>
+            </a:endParaRPr>
+          </a:p>
+        </p:txBody>
+      </p:sp>
+      <p:cxnSp>
+        <p:nvCxnSpPr>
+          <p:cNvPr id="45" name="Straight Arrow Connector 44"/>
+          <p:cNvCxnSpPr/>
+          <p:nvPr/>
+        </p:nvCxnSpPr>
+        <p:spPr>
+          <a:xfrm flipV="1">
+            <a:off x="9021445" y="3762375"/>
+            <a:ext cx="0" cy="320040"/>
           </a:xfrm>
           <a:prstGeom prst="straightConnector1">
             <a:avLst/>
@@ -5472,14 +5740,16 @@
       </p:cxnSp>
       <p:cxnSp>
         <p:nvCxnSpPr>
-          <p:cNvPr id="30" name="Straight Arrow Connector 29"/>
-          <p:cNvCxnSpPr/>
+          <p:cNvPr id="47" name="Straight Arrow Connector 46"/>
+          <p:cNvCxnSpPr>
+            <a:endCxn id="44" idx="1"/>
+          </p:cNvCxnSpPr>
           <p:nvPr/>
         </p:nvCxnSpPr>
         <p:spPr>
           <a:xfrm>
-            <a:off x="8968105" y="3150870"/>
-            <a:ext cx="1597660" cy="701040"/>
+            <a:off x="7345680" y="4406265"/>
+            <a:ext cx="211455" cy="4445"/>
           </a:xfrm>
           <a:prstGeom prst="straightConnector1">
             <a:avLst/>
@@ -5509,14 +5779,14 @@
       </p:cxnSp>
       <p:sp>
         <p:nvSpPr>
-          <p:cNvPr id="31" name="Rectangles 30"/>
+          <p:cNvPr id="48" name="Rectangles 47"/>
           <p:cNvSpPr/>
           <p:nvPr/>
         </p:nvSpPr>
         <p:spPr>
           <a:xfrm>
-            <a:off x="286385" y="4152265"/>
-            <a:ext cx="2743200" cy="400685"/>
+            <a:off x="1264285" y="803910"/>
+            <a:ext cx="2928620" cy="400685"/>
           </a:xfrm>
           <a:prstGeom prst="rect">
             <a:avLst/>
@@ -5556,20 +5826,25 @@
         <p:txBody>
           <a:bodyPr rtlCol="0" anchor="ctr"/>
           <a:p>
-            <a:pPr algn="ctr"/>
-            <a:r>
-              <a:rPr lang="en-US" sz="1700">
+            <a:pPr indent="0" algn="ctr" fontAlgn="auto">
+              <a:lnSpc>
+                <a:spcPct val="110000"/>
+              </a:lnSpc>
+            </a:pPr>
+            <a:r>
+              <a:rPr lang="en-US" sz="1600">
                 <a:solidFill>
                   <a:srgbClr val="FFA1A1"/>
                 </a:solidFill>
                 <a:latin typeface="Ubuntu Mono" panose="020B0509030602030204" charset="0"/>
                 <a:ea typeface="FZHei-B01" panose="03000509000000000000" charset="-122"/>
                 <a:cs typeface="Ubuntu Mono" panose="020B0509030602030204" charset="0"/>
-              </a:rPr>
-              <a:t>type</a:t>
-            </a:r>
-            <a:r>
-              <a:rPr lang="en-US" sz="1700">
+                <a:sym typeface="+mn-ea"/>
+              </a:rPr>
+              <a:t>abbr</a:t>
+            </a:r>
+            <a:r>
+              <a:rPr lang="en-US" sz="1600">
                 <a:solidFill>
                   <a:schemeClr val="tx1"/>
                 </a:solidFill>
@@ -5581,272 +5856,53 @@
               <a:t> </a:t>
             </a:r>
             <a:r>
-              <a:rPr lang="en-US" sz="1700">
+              <a:rPr lang="en-US" sz="1600">
                 <a:solidFill>
                   <a:srgbClr val="FF0000"/>
                 </a:solidFill>
                 <a:latin typeface="Helvetica Now Display" panose="020B0604030202020204" charset="0"/>
                 <a:ea typeface="FZHei-B01" panose="03000509000000000000" charset="-122"/>
                 <a:cs typeface="Helvetica Now Display" panose="020B0604030202020204" charset="0"/>
-              </a:rPr>
-              <a:t>D::Stride</a:t>
-            </a:r>
-            <a:r>
-              <a:rPr lang="en-US" sz="1700">
+                <a:sym typeface="+mn-ea"/>
+              </a:rPr>
+              <a:t>TR</a:t>
+            </a:r>
+            <a:r>
+              <a:rPr lang="en-US" sz="1600">
                 <a:solidFill>
                   <a:schemeClr val="tx1"/>
                 </a:solidFill>
                 <a:latin typeface="Helvetica Now Display" panose="020B0604030202020204" charset="0"/>
                 <a:ea typeface="FZHei-B01" panose="03000509000000000000" charset="-122"/>
                 <a:cs typeface="Helvetica Now Display" panose="020B0604030202020204" charset="0"/>
+                <a:sym typeface="+mn-ea"/>
               </a:rPr>
               <a:t> </a:t>
             </a:r>
             <a:r>
-              <a:rPr lang="en-US" sz="1700">
+              <a:rPr lang="en-US" sz="1600">
                 <a:solidFill>
                   <a:srgbClr val="FFA1A1"/>
                 </a:solidFill>
                 <a:latin typeface="Helvetica Now Display" panose="020B0604030202020204" charset="0"/>
                 <a:ea typeface="FZHei-B01" panose="03000509000000000000" charset="-122"/>
                 <a:cs typeface="Helvetica Now Display" panose="020B0604030202020204" charset="0"/>
-              </a:rPr>
-              <a:t>(stride)</a:t>
-            </a:r>
-            <a:endParaRPr lang="en-US" sz="1700">
+                <a:sym typeface="+mn-ea"/>
+              </a:rPr>
+              <a:t>(tensor)</a:t>
+            </a:r>
+            <a:endParaRPr lang="en-US" sz="1600">
               <a:solidFill>
                 <a:srgbClr val="FFA1A1"/>
               </a:solidFill>
               <a:latin typeface="Helvetica Now Display" panose="020B0604030202020204" charset="0"/>
               <a:ea typeface="FZHei-B01" panose="03000509000000000000" charset="-122"/>
               <a:cs typeface="Helvetica Now Display" panose="020B0604030202020204" charset="0"/>
-            </a:endParaRPr>
-          </a:p>
-        </p:txBody>
-      </p:sp>
-      <p:sp>
-        <p:nvSpPr>
-          <p:cNvPr id="32" name="Rectangles 31"/>
-          <p:cNvSpPr/>
-          <p:nvPr/>
-        </p:nvSpPr>
-        <p:spPr>
-          <a:xfrm>
-            <a:off x="286385" y="4552950"/>
-            <a:ext cx="2743200" cy="400685"/>
-          </a:xfrm>
-          <a:prstGeom prst="rect">
-            <a:avLst/>
-          </a:prstGeom>
-          <a:noFill/>
-          <a:ln w="19050">
-            <a:solidFill>
-              <a:schemeClr val="tx1"/>
-            </a:solidFill>
-          </a:ln>
-          <a:extLst>
-            <a:ext uri="{909E8E84-426E-40DD-AFC4-6F175D3DCCD1}">
-              <a14:hiddenFill xmlns:a14="http://schemas.microsoft.com/office/drawing/2010/main">
-                <a:solidFill>
-                  <a:schemeClr val="accent1"/>
-                </a:solidFill>
-              </a14:hiddenFill>
-            </a:ext>
-          </a:extLst>
-        </p:spPr>
-        <p:style>
-          <a:lnRef idx="2">
-            <a:schemeClr val="accent1">
-              <a:lumMod val="75000"/>
-            </a:schemeClr>
-          </a:lnRef>
-          <a:fillRef idx="1">
-            <a:schemeClr val="accent1"/>
-          </a:fillRef>
-          <a:effectRef idx="0">
-            <a:srgbClr val="FFFFFF"/>
-          </a:effectRef>
-          <a:fontRef idx="minor">
-            <a:schemeClr val="lt1"/>
-          </a:fontRef>
-        </p:style>
-        <p:txBody>
-          <a:bodyPr rtlCol="0" anchor="ctr"/>
-          <a:p>
-            <a:pPr algn="ctr"/>
-            <a:r>
-              <a:rPr lang="en-US" sz="1700">
-                <a:solidFill>
-                  <a:srgbClr val="FFA1A1"/>
-                </a:solidFill>
-                <a:latin typeface="Ubuntu Mono" panose="020B0509030602030204" charset="0"/>
-                <a:ea typeface="FZHei-B01" panose="03000509000000000000" charset="-122"/>
-                <a:cs typeface="Ubuntu Mono" panose="020B0509030602030204" charset="0"/>
-              </a:rPr>
-              <a:t>attribute</a:t>
-            </a:r>
-            <a:r>
-              <a:rPr lang="en-US" sz="1700">
-                <a:solidFill>
-                  <a:schemeClr val="tx1"/>
-                </a:solidFill>
-                <a:latin typeface="Helvetica Now Display" panose="020B0604030202020204" charset="0"/>
-                <a:ea typeface="FZHei-B01" panose="03000509000000000000" charset="-122"/>
-                <a:cs typeface="Helvetica Now Display" panose="020B0604030202020204" charset="0"/>
-                <a:sym typeface="+mn-ea"/>
-              </a:rPr>
-              <a:t> </a:t>
-            </a:r>
-            <a:r>
-              <a:rPr lang="en-US" sz="1700">
-                <a:solidFill>
-                  <a:srgbClr val="FF0000"/>
-                </a:solidFill>
-                <a:latin typeface="Helvetica Now Display" panose="020B0604030202020204" charset="0"/>
-                <a:ea typeface="FZHei-B01" panose="03000509000000000000" charset="-122"/>
-                <a:cs typeface="Helvetica Now Display" panose="020B0604030202020204" charset="0"/>
-              </a:rPr>
-              <a:t>offset</a:t>
-            </a:r>
-            <a:endParaRPr lang="en-US" sz="1700">
-              <a:solidFill>
-                <a:srgbClr val="FFA1A1"/>
-              </a:solidFill>
-              <a:latin typeface="Helvetica Now Display" panose="020B0604030202020204" charset="0"/>
-              <a:ea typeface="FZHei-B01" panose="03000509000000000000" charset="-122"/>
-              <a:cs typeface="Helvetica Now Display" panose="020B0604030202020204" charset="0"/>
-            </a:endParaRPr>
-          </a:p>
-        </p:txBody>
-      </p:sp>
-      <p:sp>
-        <p:nvSpPr>
-          <p:cNvPr id="33" name="Rectangles 32"/>
-          <p:cNvSpPr/>
-          <p:nvPr/>
-        </p:nvSpPr>
-        <p:spPr>
-          <a:xfrm>
-            <a:off x="6224905" y="5053965"/>
-            <a:ext cx="2743200" cy="400685"/>
-          </a:xfrm>
-          <a:prstGeom prst="rect">
-            <a:avLst/>
-          </a:prstGeom>
-          <a:noFill/>
-          <a:ln w="19050">
-            <a:solidFill>
-              <a:schemeClr val="tx1"/>
-            </a:solidFill>
-          </a:ln>
-          <a:extLst>
-            <a:ext uri="{909E8E84-426E-40DD-AFC4-6F175D3DCCD1}">
-              <a14:hiddenFill xmlns:a14="http://schemas.microsoft.com/office/drawing/2010/main">
-                <a:solidFill>
-                  <a:schemeClr val="accent1"/>
-                </a:solidFill>
-              </a14:hiddenFill>
-            </a:ext>
-          </a:extLst>
-        </p:spPr>
-        <p:style>
-          <a:lnRef idx="2">
-            <a:schemeClr val="accent1">
-              <a:lumMod val="75000"/>
-            </a:schemeClr>
-          </a:lnRef>
-          <a:fillRef idx="1">
-            <a:schemeClr val="accent1"/>
-          </a:fillRef>
-          <a:effectRef idx="0">
-            <a:srgbClr val="FFFFFF"/>
-          </a:effectRef>
-          <a:fontRef idx="minor">
-            <a:schemeClr val="lt1"/>
-          </a:fontRef>
-        </p:style>
-        <p:txBody>
-          <a:bodyPr rtlCol="0" anchor="ctr"/>
-          <a:p>
-            <a:pPr algn="ctr"/>
-            <a:r>
-              <a:rPr lang="en-US" sz="1700">
-                <a:solidFill>
-                  <a:schemeClr val="bg1">
-                    <a:lumMod val="65000"/>
-                  </a:schemeClr>
-                </a:solidFill>
-                <a:latin typeface="Ubuntu Mono" panose="020B0509030602030204" charset="0"/>
-                <a:ea typeface="FZHei-B01" panose="03000509000000000000" charset="-122"/>
-                <a:cs typeface="Ubuntu Mono" panose="020B0509030602030204" charset="0"/>
-                <a:sym typeface="+mn-ea"/>
-              </a:rPr>
-              <a:t>trait</a:t>
-            </a:r>
-            <a:r>
-              <a:rPr lang="en-US" sz="1700">
-                <a:solidFill>
-                  <a:schemeClr val="tx1"/>
-                </a:solidFill>
-                <a:latin typeface="Helvetica Now Display" panose="020B0604030202020204" charset="0"/>
-                <a:ea typeface="FZHei-B01" panose="03000509000000000000" charset="-122"/>
-                <a:cs typeface="Helvetica Now Display" panose="020B0604030202020204" charset="0"/>
-                <a:sym typeface="+mn-ea"/>
-              </a:rPr>
-              <a:t> DeviceAPI&lt;T&gt;</a:t>
-            </a:r>
-            <a:endParaRPr lang="en-US" sz="1700">
-              <a:solidFill>
-                <a:schemeClr val="tx1"/>
-              </a:solidFill>
-              <a:latin typeface="Helvetica Now Display" panose="020B0604030202020204" charset="0"/>
-              <a:ea typeface="FZHei-B01" panose="03000509000000000000" charset="-122"/>
-              <a:cs typeface="Helvetica Now Display" panose="020B0604030202020204" charset="0"/>
               <a:sym typeface="+mn-ea"/>
             </a:endParaRPr>
           </a:p>
         </p:txBody>
       </p:sp>
-      <p:cxnSp>
-        <p:nvCxnSpPr>
-          <p:cNvPr id="34" name="Straight Arrow Connector 33"/>
-          <p:cNvCxnSpPr>
-            <a:stCxn id="33" idx="3"/>
-            <a:endCxn id="24" idx="2"/>
-          </p:cNvCxnSpPr>
-          <p:nvPr/>
-        </p:nvCxnSpPr>
-        <p:spPr>
-          <a:xfrm flipV="1">
-            <a:off x="8968105" y="4653280"/>
-            <a:ext cx="1597660" cy="601345"/>
-          </a:xfrm>
-          <a:prstGeom prst="straightConnector1">
-            <a:avLst/>
-          </a:prstGeom>
-          <a:ln w="19050">
-            <a:solidFill>
-              <a:schemeClr val="tx1"/>
-            </a:solidFill>
-            <a:round/>
-            <a:tailEnd type="triangle" w="med" len="lg"/>
-          </a:ln>
-        </p:spPr>
-        <p:style>
-          <a:lnRef idx="2">
-            <a:schemeClr val="accent1"/>
-          </a:lnRef>
-          <a:fillRef idx="0">
-            <a:srgbClr val="FFFFFF"/>
-          </a:fillRef>
-          <a:effectRef idx="0">
-            <a:srgbClr val="FFFFFF"/>
-          </a:effectRef>
-          <a:fontRef idx="minor">
-            <a:schemeClr val="tx1"/>
-          </a:fontRef>
-        </p:style>
-      </p:cxnSp>
     </p:spTree>
   </p:cSld>
   <p:clrMapOvr>

</xml_diff>